<commit_message>
Added some updates to WCF Deck
</commit_message>
<xml_diff>
--- a/01-WCFServices/01-WCFServices.pptx
+++ b/01-WCFServices/01-WCFServices.pptx
@@ -3984,7 +3984,6 @@
               <a:rPr lang="en-US" dirty="0"/>
               <a:t>Bret Stateham | Technical Evangelist</a:t>
             </a:r>
-            <a:endParaRPr lang="en-US" dirty="0"/>
           </a:p>
         </p:txBody>
       </p:sp>
@@ -23973,15 +23972,7 @@
           <a:p>
             <a:r>
               <a:rPr lang="en-US" sz="4000" dirty="0" smtClean="0"/>
-              <a:t>Meet Bruno Terkaly </a:t>
-            </a:r>
-            <a:r>
-              <a:rPr lang="en-US" sz="4000" dirty="0" smtClean="0"/>
-              <a:t>| ‏</a:t>
-            </a:r>
-            <a:r>
-              <a:rPr lang="en-US" sz="4000" dirty="0" smtClean="0"/>
-              <a:t>@</a:t>
+              <a:t>Meet Bruno Terkaly | ‏@</a:t>
             </a:r>
             <a:r>
               <a:rPr lang="en-US" sz="4000" dirty="0" err="1" smtClean="0"/>
@@ -24012,25 +24003,19 @@
           <a:p>
             <a:r>
               <a:rPr lang="en-US" dirty="0" smtClean="0"/>
-              <a:t>Taller than Bret</a:t>
+              <a:t>Monthly Columnist MSDN Magazine</a:t>
             </a:r>
           </a:p>
           <a:p>
             <a:r>
               <a:rPr lang="en-US" dirty="0" smtClean="0"/>
-              <a:t>Has hair</a:t>
+              <a:t>Expertise in Windows Azure / Windows 8</a:t>
             </a:r>
           </a:p>
           <a:p>
             <a:r>
               <a:rPr lang="en-US" dirty="0" smtClean="0"/>
-              <a:t>Doesn’t live in Redmond</a:t>
-            </a:r>
-          </a:p>
-          <a:p>
-            <a:r>
-              <a:rPr lang="en-US" dirty="0" smtClean="0"/>
-              <a:t>Wears shoes (sometimes)</a:t>
+              <a:t>Principal Technical Evangelist – Silicon Valley</a:t>
             </a:r>
           </a:p>
           <a:p>
@@ -24058,7 +24043,6 @@
               <a:rPr lang="en-US" dirty="0" smtClean="0"/>
               <a:t>   </a:t>
             </a:r>
-            <a:endParaRPr lang="en-US" dirty="0" smtClean="0"/>
           </a:p>
           <a:p>
             <a:endParaRPr lang="en-US" dirty="0" smtClean="0"/>
@@ -24075,11 +24059,11 @@
   <p:clrMapOvr>
     <a:masterClrMapping/>
   </p:clrMapOvr>
-  <mc:AlternateContent xmlns:mc="http://schemas.openxmlformats.org/markup-compatibility/2006">
-    <mc:Choice xmlns:p14="http://schemas.microsoft.com/office/powerpoint/2010/main" Requires="p14">
+  <mc:AlternateContent xmlns:mc="http://schemas.openxmlformats.org/markup-compatibility/2006" xmlns:p14="http://schemas.microsoft.com/office/powerpoint/2010/main">
+    <mc:Choice Requires="p14">
       <p:transition spd="slow" p14:dur="2000"/>
     </mc:Choice>
-    <mc:Fallback>
+    <mc:Fallback xmlns="">
       <p:transition spd="slow"/>
     </mc:Fallback>
   </mc:AlternateContent>
@@ -24232,15 +24216,7 @@
             </a:r>
             <a:r>
               <a:rPr lang="en-US" sz="4000" dirty="0" smtClean="0"/>
-              <a:t> </a:t>
-            </a:r>
-            <a:r>
-              <a:rPr lang="en-US" sz="4000" dirty="0" smtClean="0"/>
-              <a:t>| </a:t>
-            </a:r>
-            <a:r>
-              <a:rPr lang="en-US" sz="4000" dirty="0" smtClean="0"/>
-              <a:t>@</a:t>
+              <a:t> | @</a:t>
             </a:r>
             <a:r>
               <a:rPr lang="en-US" sz="4000" dirty="0" err="1" smtClean="0"/>
@@ -24321,11 +24297,11 @@
   <p:clrMapOvr>
     <a:masterClrMapping/>
   </p:clrMapOvr>
-  <mc:AlternateContent xmlns:mc="http://schemas.openxmlformats.org/markup-compatibility/2006">
-    <mc:Choice xmlns:p14="http://schemas.microsoft.com/office/powerpoint/2010/main" Requires="p14">
+  <mc:AlternateContent xmlns:mc="http://schemas.openxmlformats.org/markup-compatibility/2006" xmlns:p14="http://schemas.microsoft.com/office/powerpoint/2010/main">
+    <mc:Choice Requires="p14">
       <p:transition spd="slow" p14:dur="2000"/>
     </mc:Choice>
-    <mc:Fallback>
+    <mc:Fallback xmlns="">
       <p:transition spd="slow"/>
     </mc:Fallback>
   </mc:AlternateContent>
@@ -24465,12 +24441,16 @@
           </p:cNvGraphicFramePr>
           <p:nvPr>
             <p:ph sz="quarter" idx="10"/>
-            <p:extLst/>
+            <p:extLst>
+              <p:ext uri="{D42A27DB-BD31-4B8C-83A1-F6EECF244321}">
+                <p14:modId xmlns:p14="http://schemas.microsoft.com/office/powerpoint/2010/main" val="2619855081"/>
+              </p:ext>
+            </p:extLst>
           </p:nvPr>
         </p:nvGraphicFramePr>
         <p:xfrm>
           <a:off x="379413" y="1417636"/>
-          <a:ext cx="11525250" cy="3893488"/>
+          <a:ext cx="11525250" cy="3838160"/>
         </p:xfrm>
         <a:graphic>
           <a:graphicData uri="http://schemas.openxmlformats.org/drawingml/2006/table">
@@ -24532,14 +24512,7 @@
                           <a:latin typeface="Segoe UI Light" panose="020B0502040204020203" pitchFamily="34" charset="0"/>
                           <a:cs typeface="Segoe UI Light" panose="020B0502040204020203" pitchFamily="34" charset="0"/>
                         </a:rPr>
-                        <a:t>01 | Introduction</a:t>
-                      </a:r>
-                      <a:r>
-                        <a:rPr lang="en-US" sz="2400" baseline="0" dirty="0" smtClean="0">
-                          <a:latin typeface="Segoe UI Light" panose="020B0502040204020203" pitchFamily="34" charset="0"/>
-                          <a:cs typeface="Segoe UI Light" panose="020B0502040204020203" pitchFamily="34" charset="0"/>
-                        </a:rPr>
-                        <a:t> to the SharePoint Developer Landscape</a:t>
+                        <a:t>01 | WCF Services</a:t>
                       </a:r>
                       <a:endParaRPr lang="en-US" sz="2400" dirty="0">
                         <a:latin typeface="Segoe UI Light" panose="020B0502040204020203" pitchFamily="34" charset="0"/>
@@ -24563,7 +24536,7 @@
                           <a:ea typeface="+mn-ea"/>
                           <a:cs typeface="Segoe UI Light" panose="020B0502040204020203" pitchFamily="34" charset="0"/>
                         </a:rPr>
-                        <a:t>05 | Cloud Hosted Apps</a:t>
+                        <a:t>05 | Entity Framework</a:t>
                       </a:r>
                       <a:endParaRPr lang="en-US" sz="2400" kern="1200" dirty="0">
                         <a:solidFill>
@@ -24589,7 +24562,7 @@
                           <a:latin typeface="Segoe UI Light" panose="020B0502040204020203" pitchFamily="34" charset="0"/>
                           <a:cs typeface="Segoe UI Light" panose="020B0502040204020203" pitchFamily="34" charset="0"/>
                         </a:rPr>
-                        <a:t>02 | Lists and Sites</a:t>
+                        <a:t>02 | Hosting Services in Windows Azure</a:t>
                       </a:r>
                       <a:endParaRPr lang="en-US" sz="2400" dirty="0">
                         <a:latin typeface="Segoe UI Light" panose="020B0502040204020203" pitchFamily="34" charset="0"/>
@@ -24609,14 +24582,14 @@
                           <a:latin typeface="Segoe UI Light" panose="020B0502040204020203" pitchFamily="34" charset="0"/>
                           <a:cs typeface="Segoe UI Light" panose="020B0502040204020203" pitchFamily="34" charset="0"/>
                         </a:rPr>
-                        <a:t>06 | Deploying</a:t>
+                        <a:t>06 | Web</a:t>
                       </a:r>
                       <a:r>
                         <a:rPr lang="en-US" sz="2400" baseline="0" dirty="0" smtClean="0">
                           <a:latin typeface="Segoe UI Light" panose="020B0502040204020203" pitchFamily="34" charset="0"/>
                           <a:cs typeface="Segoe UI Light" panose="020B0502040204020203" pitchFamily="34" charset="0"/>
                         </a:rPr>
-                        <a:t> Apps</a:t>
+                        <a:t> API</a:t>
                       </a:r>
                       <a:endParaRPr lang="en-US" sz="2400" dirty="0">
                         <a:latin typeface="Segoe UI Light" panose="020B0502040204020203" pitchFamily="34" charset="0"/>
@@ -24662,7 +24635,7 @@
                           <a:latin typeface="Segoe UI Light" panose="020B0502040204020203" pitchFamily="34" charset="0"/>
                           <a:cs typeface="Segoe UI Light" panose="020B0502040204020203" pitchFamily="34" charset="0"/>
                         </a:rPr>
-                        <a:t> | Client Side SharePoint Development</a:t>
+                        <a:t> | Data Storage</a:t>
                       </a:r>
                       <a:endParaRPr lang="en-US" sz="2400" dirty="0" smtClean="0">
                         <a:latin typeface="Segoe UI Light" panose="020B0502040204020203" pitchFamily="34" charset="0"/>
@@ -24682,7 +24655,7 @@
                           <a:latin typeface="Segoe UI Light" panose="020B0502040204020203" pitchFamily="34" charset="0"/>
                           <a:cs typeface="Segoe UI Light" panose="020B0502040204020203" pitchFamily="34" charset="0"/>
                         </a:rPr>
-                        <a:t>07 | Workflows</a:t>
+                        <a:t>07 | Advanced WCF Topics</a:t>
                       </a:r>
                       <a:endParaRPr lang="en-US" sz="2400" dirty="0">
                         <a:latin typeface="Segoe UI Light" panose="020B0502040204020203" pitchFamily="34" charset="0"/>
@@ -24704,7 +24677,7 @@
                           <a:latin typeface="Segoe UI Light" panose="020B0502040204020203" pitchFamily="34" charset="0"/>
                           <a:cs typeface="Segoe UI Light" panose="020B0502040204020203" pitchFamily="34" charset="0"/>
                         </a:rPr>
-                        <a:t>04 | Apps and SharePoint</a:t>
+                        <a:t>04 | Data Access Technologies</a:t>
                       </a:r>
                       <a:endParaRPr lang="en-US" sz="2400" dirty="0">
                         <a:latin typeface="Segoe UI Light" panose="020B0502040204020203" pitchFamily="34" charset="0"/>
@@ -24742,11 +24715,11 @@
   <p:clrMapOvr>
     <a:masterClrMapping/>
   </p:clrMapOvr>
-  <mc:AlternateContent xmlns:mc="http://schemas.openxmlformats.org/markup-compatibility/2006">
-    <mc:Choice xmlns:p14="http://schemas.microsoft.com/office/powerpoint/2010/main" Requires="p14">
+  <mc:AlternateContent xmlns:mc="http://schemas.openxmlformats.org/markup-compatibility/2006" xmlns:p14="http://schemas.microsoft.com/office/powerpoint/2010/main">
+    <mc:Choice Requires="p14">
       <p:transition spd="slow" p14:dur="2000"/>
     </mc:Choice>
-    <mc:Fallback>
+    <mc:Fallback xmlns="">
       <p:transition spd="slow"/>
     </mc:Fallback>
   </mc:AlternateContent>
@@ -25057,13 +25030,13 @@
   <p:clrMapOvr>
     <a:masterClrMapping/>
   </p:clrMapOvr>
-  <mc:AlternateContent xmlns:mc="http://schemas.openxmlformats.org/markup-compatibility/2006">
-    <mc:Choice xmlns:p14="http://schemas.microsoft.com/office/powerpoint/2010/main" Requires="p14">
+  <mc:AlternateContent xmlns:mc="http://schemas.openxmlformats.org/markup-compatibility/2006" xmlns:p14="http://schemas.microsoft.com/office/powerpoint/2010/main">
+    <mc:Choice Requires="p14">
       <p:transition spd="med" p14:dur="700">
         <p:fade/>
       </p:transition>
     </mc:Choice>
-    <mc:Fallback>
+    <mc:Fallback xmlns="">
       <p:transition spd="med">
         <p:fade/>
       </p:transition>
@@ -25114,11 +25087,7 @@
             <a:pPr marL="914400" indent="-914400"/>
             <a:r>
               <a:rPr lang="en-US" dirty="0" smtClean="0"/>
-              <a:t>01 | </a:t>
-            </a:r>
-            <a:r>
-              <a:rPr lang="en-US" dirty="0" smtClean="0"/>
-              <a:t>WCF Services</a:t>
+              <a:t>01 | WCF Services</a:t>
             </a:r>
             <a:endParaRPr lang="en-US" dirty="0"/>
           </a:p>
@@ -25217,11 +25186,7 @@
           <a:p>
             <a:r>
               <a:rPr lang="en-US" dirty="0" smtClean="0"/>
-              <a:t>WCF </a:t>
-            </a:r>
-            <a:r>
-              <a:rPr lang="en-US" dirty="0" smtClean="0"/>
-              <a:t>Overview</a:t>
+              <a:t>WCF Overview</a:t>
             </a:r>
             <a:endParaRPr lang="en-US" dirty="0"/>
           </a:p>
@@ -26315,15 +26280,15 @@
 <file path=customXml/itemProps1.xml><?xml version="1.0" encoding="utf-8"?>
 <ds:datastoreItem xmlns:ds="http://schemas.openxmlformats.org/officeDocument/2006/customXml" ds:itemID="{7025FDD9-4C58-4084-9F89-0E6ADD6FFF55}">
   <ds:schemaRefs>
+    <ds:schemaRef ds:uri="http://schemas.openxmlformats.org/package/2006/metadata/core-properties"/>
+    <ds:schemaRef ds:uri="http://schemas.microsoft.com/office/2006/documentManagement/types"/>
+    <ds:schemaRef ds:uri="http://schemas.microsoft.com/office/2006/metadata/properties"/>
+    <ds:schemaRef ds:uri="230e9df3-be65-4c73-a93b-d1236ebd677e"/>
+    <ds:schemaRef ds:uri="9144449b-ba5a-4612-98a9-381e907e54b6"/>
+    <ds:schemaRef ds:uri="http://schemas.microsoft.com/office/infopath/2007/PartnerControls"/>
+    <ds:schemaRef ds:uri="http://purl.org/dc/elements/1.1/"/>
     <ds:schemaRef ds:uri="http://www.w3.org/XML/1998/namespace"/>
-    <ds:schemaRef ds:uri="http://schemas.microsoft.com/office/2006/documentManagement/types"/>
-    <ds:schemaRef ds:uri="http://schemas.openxmlformats.org/package/2006/metadata/core-properties"/>
-    <ds:schemaRef ds:uri="http://schemas.microsoft.com/office/infopath/2007/PartnerControls"/>
-    <ds:schemaRef ds:uri="230e9df3-be65-4c73-a93b-d1236ebd677e"/>
-    <ds:schemaRef ds:uri="http://schemas.microsoft.com/office/2006/metadata/properties"/>
-    <ds:schemaRef ds:uri="http://purl.org/dc/elements/1.1/"/>
     <ds:schemaRef ds:uri="http://purl.org/dc/dcmitype/"/>
-    <ds:schemaRef ds:uri="9144449b-ba5a-4612-98a9-381e907e54b6"/>
     <ds:schemaRef ds:uri="http://purl.org/dc/terms/"/>
   </ds:schemaRefs>
 </ds:datastoreItem>

</xml_diff>

<commit_message>
Updated WCF Intro Slides
</commit_message>
<xml_diff>
--- a/01-WCFServices/01-WCFServices.pptx
+++ b/01-WCFServices/01-WCFServices.pptx
@@ -5,10 +5,10 @@
     <p:sldMasterId id="2147483660" r:id="rId4"/>
   </p:sldMasterIdLst>
   <p:notesMasterIdLst>
-    <p:notesMasterId r:id="rId57"/>
+    <p:notesMasterId r:id="rId56"/>
   </p:notesMasterIdLst>
   <p:handoutMasterIdLst>
-    <p:handoutMasterId r:id="rId58"/>
+    <p:handoutMasterId r:id="rId57"/>
   </p:handoutMasterIdLst>
   <p:sldIdLst>
     <p:sldId id="311" r:id="rId5"/>
@@ -18,51 +18,50 @@
     <p:sldId id="315" r:id="rId9"/>
     <p:sldId id="316" r:id="rId10"/>
     <p:sldId id="277" r:id="rId11"/>
-    <p:sldId id="278" r:id="rId12"/>
-    <p:sldId id="285" r:id="rId13"/>
+    <p:sldId id="285" r:id="rId12"/>
+    <p:sldId id="278" r:id="rId13"/>
     <p:sldId id="309" r:id="rId14"/>
     <p:sldId id="279" r:id="rId15"/>
     <p:sldId id="306" r:id="rId16"/>
     <p:sldId id="281" r:id="rId17"/>
     <p:sldId id="307" r:id="rId18"/>
-    <p:sldId id="310" r:id="rId19"/>
-    <p:sldId id="303" r:id="rId20"/>
-    <p:sldId id="304" r:id="rId21"/>
-    <p:sldId id="305" r:id="rId22"/>
-    <p:sldId id="308" r:id="rId23"/>
-    <p:sldId id="293" r:id="rId24"/>
-    <p:sldId id="317" r:id="rId25"/>
-    <p:sldId id="318" r:id="rId26"/>
-    <p:sldId id="319" r:id="rId27"/>
-    <p:sldId id="320" r:id="rId28"/>
-    <p:sldId id="321" r:id="rId29"/>
-    <p:sldId id="322" r:id="rId30"/>
-    <p:sldId id="323" r:id="rId31"/>
-    <p:sldId id="324" r:id="rId32"/>
-    <p:sldId id="325" r:id="rId33"/>
-    <p:sldId id="326" r:id="rId34"/>
-    <p:sldId id="327" r:id="rId35"/>
-    <p:sldId id="328" r:id="rId36"/>
-    <p:sldId id="329" r:id="rId37"/>
-    <p:sldId id="330" r:id="rId38"/>
-    <p:sldId id="331" r:id="rId39"/>
-    <p:sldId id="332" r:id="rId40"/>
-    <p:sldId id="333" r:id="rId41"/>
-    <p:sldId id="334" r:id="rId42"/>
-    <p:sldId id="335" r:id="rId43"/>
-    <p:sldId id="336" r:id="rId44"/>
-    <p:sldId id="337" r:id="rId45"/>
-    <p:sldId id="338" r:id="rId46"/>
-    <p:sldId id="339" r:id="rId47"/>
-    <p:sldId id="340" r:id="rId48"/>
-    <p:sldId id="341" r:id="rId49"/>
-    <p:sldId id="342" r:id="rId50"/>
-    <p:sldId id="343" r:id="rId51"/>
-    <p:sldId id="344" r:id="rId52"/>
-    <p:sldId id="345" r:id="rId53"/>
-    <p:sldId id="346" r:id="rId54"/>
-    <p:sldId id="347" r:id="rId55"/>
-    <p:sldId id="269" r:id="rId56"/>
+    <p:sldId id="303" r:id="rId19"/>
+    <p:sldId id="304" r:id="rId20"/>
+    <p:sldId id="305" r:id="rId21"/>
+    <p:sldId id="308" r:id="rId22"/>
+    <p:sldId id="293" r:id="rId23"/>
+    <p:sldId id="317" r:id="rId24"/>
+    <p:sldId id="318" r:id="rId25"/>
+    <p:sldId id="319" r:id="rId26"/>
+    <p:sldId id="320" r:id="rId27"/>
+    <p:sldId id="321" r:id="rId28"/>
+    <p:sldId id="322" r:id="rId29"/>
+    <p:sldId id="323" r:id="rId30"/>
+    <p:sldId id="324" r:id="rId31"/>
+    <p:sldId id="325" r:id="rId32"/>
+    <p:sldId id="326" r:id="rId33"/>
+    <p:sldId id="327" r:id="rId34"/>
+    <p:sldId id="328" r:id="rId35"/>
+    <p:sldId id="329" r:id="rId36"/>
+    <p:sldId id="330" r:id="rId37"/>
+    <p:sldId id="331" r:id="rId38"/>
+    <p:sldId id="332" r:id="rId39"/>
+    <p:sldId id="333" r:id="rId40"/>
+    <p:sldId id="334" r:id="rId41"/>
+    <p:sldId id="335" r:id="rId42"/>
+    <p:sldId id="336" r:id="rId43"/>
+    <p:sldId id="337" r:id="rId44"/>
+    <p:sldId id="338" r:id="rId45"/>
+    <p:sldId id="339" r:id="rId46"/>
+    <p:sldId id="340" r:id="rId47"/>
+    <p:sldId id="341" r:id="rId48"/>
+    <p:sldId id="342" r:id="rId49"/>
+    <p:sldId id="343" r:id="rId50"/>
+    <p:sldId id="344" r:id="rId51"/>
+    <p:sldId id="345" r:id="rId52"/>
+    <p:sldId id="346" r:id="rId53"/>
+    <p:sldId id="347" r:id="rId54"/>
+    <p:sldId id="269" r:id="rId55"/>
   </p:sldIdLst>
   <p:sldSz cx="12192000" cy="6858000"/>
   <p:notesSz cx="6858000" cy="9144000"/>
@@ -850,7 +849,7 @@
             <a:fld id="{13F0F35F-DD44-4607-AEC1-49D7A4BC4066}" type="slidenum">
               <a:rPr lang="en-US" smtClean="0"/>
               <a:pPr/>
-              <a:t>23</a:t>
+              <a:t>22</a:t>
             </a:fld>
             <a:endParaRPr lang="en-US" dirty="0"/>
           </a:p>
@@ -942,7 +941,7 @@
             <a:fld id="{13F0F35F-DD44-4607-AEC1-49D7A4BC4066}" type="slidenum">
               <a:rPr lang="en-US" smtClean="0"/>
               <a:pPr/>
-              <a:t>25</a:t>
+              <a:t>24</a:t>
             </a:fld>
             <a:endParaRPr lang="en-US" dirty="0"/>
           </a:p>
@@ -1034,7 +1033,7 @@
             <a:fld id="{13F0F35F-DD44-4607-AEC1-49D7A4BC4066}" type="slidenum">
               <a:rPr lang="en-US" smtClean="0"/>
               <a:pPr/>
-              <a:t>26</a:t>
+              <a:t>25</a:t>
             </a:fld>
             <a:endParaRPr lang="en-US" dirty="0"/>
           </a:p>
@@ -1126,7 +1125,7 @@
             <a:fld id="{13F0F35F-DD44-4607-AEC1-49D7A4BC4066}" type="slidenum">
               <a:rPr lang="en-US" smtClean="0"/>
               <a:pPr/>
-              <a:t>27</a:t>
+              <a:t>26</a:t>
             </a:fld>
             <a:endParaRPr lang="en-US" dirty="0"/>
           </a:p>
@@ -1218,7 +1217,7 @@
             <a:fld id="{13F0F35F-DD44-4607-AEC1-49D7A4BC4066}" type="slidenum">
               <a:rPr lang="en-US" smtClean="0"/>
               <a:pPr/>
-              <a:t>28</a:t>
+              <a:t>27</a:t>
             </a:fld>
             <a:endParaRPr lang="en-US" dirty="0"/>
           </a:p>
@@ -1310,7 +1309,7 @@
             <a:fld id="{13F0F35F-DD44-4607-AEC1-49D7A4BC4066}" type="slidenum">
               <a:rPr lang="en-US" smtClean="0"/>
               <a:pPr/>
-              <a:t>30</a:t>
+              <a:t>29</a:t>
             </a:fld>
             <a:endParaRPr lang="en-US" dirty="0"/>
           </a:p>
@@ -1402,7 +1401,7 @@
             <a:fld id="{13F0F35F-DD44-4607-AEC1-49D7A4BC4066}" type="slidenum">
               <a:rPr lang="en-US" smtClean="0"/>
               <a:pPr/>
-              <a:t>31</a:t>
+              <a:t>30</a:t>
             </a:fld>
             <a:endParaRPr lang="en-US" dirty="0"/>
           </a:p>
@@ -1494,7 +1493,7 @@
             <a:fld id="{13F0F35F-DD44-4607-AEC1-49D7A4BC4066}" type="slidenum">
               <a:rPr lang="en-US" smtClean="0"/>
               <a:pPr/>
-              <a:t>32</a:t>
+              <a:t>31</a:t>
             </a:fld>
             <a:endParaRPr lang="en-US" dirty="0"/>
           </a:p>
@@ -1586,7 +1585,7 @@
             <a:fld id="{13F0F35F-DD44-4607-AEC1-49D7A4BC4066}" type="slidenum">
               <a:rPr lang="en-US" smtClean="0"/>
               <a:pPr/>
-              <a:t>33</a:t>
+              <a:t>32</a:t>
             </a:fld>
             <a:endParaRPr lang="en-US" dirty="0"/>
           </a:p>
@@ -1678,7 +1677,7 @@
             <a:fld id="{13F0F35F-DD44-4607-AEC1-49D7A4BC4066}" type="slidenum">
               <a:rPr lang="en-US" smtClean="0"/>
               <a:pPr/>
-              <a:t>35</a:t>
+              <a:t>34</a:t>
             </a:fld>
             <a:endParaRPr lang="en-US" dirty="0"/>
           </a:p>
@@ -1855,7 +1854,7 @@
             <a:fld id="{13F0F35F-DD44-4607-AEC1-49D7A4BC4066}" type="slidenum">
               <a:rPr lang="en-US" smtClean="0"/>
               <a:pPr/>
-              <a:t>36</a:t>
+              <a:t>35</a:t>
             </a:fld>
             <a:endParaRPr lang="en-US" dirty="0"/>
           </a:p>
@@ -1947,7 +1946,7 @@
             <a:fld id="{13F0F35F-DD44-4607-AEC1-49D7A4BC4066}" type="slidenum">
               <a:rPr lang="en-US" smtClean="0"/>
               <a:pPr/>
-              <a:t>37</a:t>
+              <a:t>36</a:t>
             </a:fld>
             <a:endParaRPr lang="en-US" dirty="0"/>
           </a:p>
@@ -2039,7 +2038,7 @@
             <a:fld id="{13F0F35F-DD44-4607-AEC1-49D7A4BC4066}" type="slidenum">
               <a:rPr lang="en-US" smtClean="0"/>
               <a:pPr/>
-              <a:t>38</a:t>
+              <a:t>37</a:t>
             </a:fld>
             <a:endParaRPr lang="en-US" dirty="0"/>
           </a:p>
@@ -2131,7 +2130,7 @@
             <a:fld id="{13F0F35F-DD44-4607-AEC1-49D7A4BC4066}" type="slidenum">
               <a:rPr lang="en-US" smtClean="0"/>
               <a:pPr/>
-              <a:t>39</a:t>
+              <a:t>38</a:t>
             </a:fld>
             <a:endParaRPr lang="en-US" dirty="0"/>
           </a:p>
@@ -2223,7 +2222,7 @@
             <a:fld id="{13F0F35F-DD44-4607-AEC1-49D7A4BC4066}" type="slidenum">
               <a:rPr lang="en-US" smtClean="0"/>
               <a:pPr/>
-              <a:t>40</a:t>
+              <a:t>39</a:t>
             </a:fld>
             <a:endParaRPr lang="en-US" dirty="0"/>
           </a:p>
@@ -2315,7 +2314,7 @@
             <a:fld id="{13F0F35F-DD44-4607-AEC1-49D7A4BC4066}" type="slidenum">
               <a:rPr lang="en-US" smtClean="0"/>
               <a:pPr/>
-              <a:t>41</a:t>
+              <a:t>40</a:t>
             </a:fld>
             <a:endParaRPr lang="en-US" dirty="0"/>
           </a:p>
@@ -2407,7 +2406,7 @@
             <a:fld id="{13F0F35F-DD44-4607-AEC1-49D7A4BC4066}" type="slidenum">
               <a:rPr lang="en-US" smtClean="0"/>
               <a:pPr/>
-              <a:t>42</a:t>
+              <a:t>41</a:t>
             </a:fld>
             <a:endParaRPr lang="en-US" dirty="0"/>
           </a:p>
@@ -2499,7 +2498,7 @@
             <a:fld id="{13F0F35F-DD44-4607-AEC1-49D7A4BC4066}" type="slidenum">
               <a:rPr lang="en-US" smtClean="0"/>
               <a:pPr/>
-              <a:t>44</a:t>
+              <a:t>43</a:t>
             </a:fld>
             <a:endParaRPr lang="en-US" dirty="0"/>
           </a:p>
@@ -2591,7 +2590,7 @@
             <a:fld id="{13F0F35F-DD44-4607-AEC1-49D7A4BC4066}" type="slidenum">
               <a:rPr lang="en-US" smtClean="0"/>
               <a:pPr/>
-              <a:t>47</a:t>
+              <a:t>46</a:t>
             </a:fld>
             <a:endParaRPr lang="en-US" dirty="0"/>
           </a:p>
@@ -2683,7 +2682,7 @@
             <a:fld id="{13F0F35F-DD44-4607-AEC1-49D7A4BC4066}" type="slidenum">
               <a:rPr lang="en-US" smtClean="0"/>
               <a:pPr/>
-              <a:t>48</a:t>
+              <a:t>47</a:t>
             </a:fld>
             <a:endParaRPr lang="en-US" dirty="0"/>
           </a:p>
@@ -2860,7 +2859,7 @@
             <a:fld id="{13F0F35F-DD44-4607-AEC1-49D7A4BC4066}" type="slidenum">
               <a:rPr lang="en-US" smtClean="0"/>
               <a:pPr/>
-              <a:t>49</a:t>
+              <a:t>48</a:t>
             </a:fld>
             <a:endParaRPr lang="en-US" dirty="0"/>
           </a:p>
@@ -2952,7 +2951,7 @@
             <a:fld id="{13F0F35F-DD44-4607-AEC1-49D7A4BC4066}" type="slidenum">
               <a:rPr lang="en-US" smtClean="0"/>
               <a:pPr/>
-              <a:t>50</a:t>
+              <a:t>49</a:t>
             </a:fld>
             <a:endParaRPr lang="en-US" dirty="0"/>
           </a:p>
@@ -3395,7 +3394,7 @@
             <a:fld id="{13F0F35F-DD44-4607-AEC1-49D7A4BC4066}" type="slidenum">
               <a:rPr lang="en-US" smtClean="0"/>
               <a:pPr/>
-              <a:t>8</a:t>
+              <a:t>9</a:t>
             </a:fld>
             <a:endParaRPr lang="en-US" dirty="0"/>
           </a:p>
@@ -3487,7 +3486,7 @@
             <a:fld id="{13F0F35F-DD44-4607-AEC1-49D7A4BC4066}" type="slidenum">
               <a:rPr lang="en-US" smtClean="0"/>
               <a:pPr/>
-              <a:t>22</a:t>
+              <a:t>21</a:t>
             </a:fld>
             <a:endParaRPr lang="en-US" dirty="0"/>
           </a:p>
@@ -23748,78 +23747,6 @@
       </p:grpSpPr>
       <p:sp>
         <p:nvSpPr>
-          <p:cNvPr id="5" name="Text Placeholder 4"/>
-          <p:cNvSpPr>
-            <a:spLocks noGrp="1"/>
-          </p:cNvSpPr>
-          <p:nvPr>
-            <p:ph type="body" sz="quarter" idx="10"/>
-          </p:nvPr>
-        </p:nvSpPr>
-        <p:spPr/>
-        <p:txBody>
-          <a:bodyPr/>
-          <a:lstStyle/>
-          <a:p>
-            <a:r>
-              <a:rPr lang="en-US" dirty="0" smtClean="0"/>
-              <a:t>SOAP vs. REST</a:t>
-            </a:r>
-            <a:endParaRPr lang="en-US" dirty="0"/>
-          </a:p>
-        </p:txBody>
-      </p:sp>
-      <p:sp>
-        <p:nvSpPr>
-          <p:cNvPr id="4" name="Subtitle 3"/>
-          <p:cNvSpPr>
-            <a:spLocks noGrp="1"/>
-          </p:cNvSpPr>
-          <p:nvPr>
-            <p:ph type="subTitle" idx="1"/>
-          </p:nvPr>
-        </p:nvSpPr>
-        <p:spPr/>
-        <p:txBody>
-          <a:bodyPr/>
-          <a:lstStyle/>
-          <a:p>
-            <a:endParaRPr lang="en-US"/>
-          </a:p>
-        </p:txBody>
-      </p:sp>
-    </p:spTree>
-    <p:extLst>
-      <p:ext uri="{BB962C8B-B14F-4D97-AF65-F5344CB8AC3E}">
-        <p14:creationId xmlns:p14="http://schemas.microsoft.com/office/powerpoint/2010/main" val="1750927414"/>
-      </p:ext>
-    </p:extLst>
-  </p:cSld>
-  <p:clrMapOvr>
-    <a:masterClrMapping/>
-  </p:clrMapOvr>
-</p:sld>
-</file>
-
-<file path=ppt/slides/slide16.xml><?xml version="1.0" encoding="utf-8"?>
-<p:sld xmlns:a="http://schemas.openxmlformats.org/drawingml/2006/main" xmlns:r="http://schemas.openxmlformats.org/officeDocument/2006/relationships" xmlns:p="http://schemas.openxmlformats.org/presentationml/2006/main">
-  <p:cSld>
-    <p:spTree>
-      <p:nvGrpSpPr>
-        <p:cNvPr id="1" name=""/>
-        <p:cNvGrpSpPr/>
-        <p:nvPr/>
-      </p:nvGrpSpPr>
-      <p:grpSpPr>
-        <a:xfrm>
-          <a:off x="0" y="0"/>
-          <a:ext cx="0" cy="0"/>
-          <a:chOff x="0" y="0"/>
-          <a:chExt cx="0" cy="0"/>
-        </a:xfrm>
-      </p:grpSpPr>
-      <p:sp>
-        <p:nvSpPr>
           <p:cNvPr id="1252" name="Title 1"/>
           <p:cNvSpPr>
             <a:spLocks noGrp="1"/>
@@ -24301,7 +24228,7 @@
 </p:sld>
 </file>
 
-<file path=ppt/slides/slide17.xml><?xml version="1.0" encoding="utf-8"?>
+<file path=ppt/slides/slide16.xml><?xml version="1.0" encoding="utf-8"?>
 <p:sld xmlns:a="http://schemas.openxmlformats.org/drawingml/2006/main" xmlns:r="http://schemas.openxmlformats.org/officeDocument/2006/relationships" xmlns:p="http://schemas.openxmlformats.org/presentationml/2006/main">
   <p:cSld>
     <p:spTree>
@@ -24563,7 +24490,7 @@
 </p:sld>
 </file>
 
-<file path=ppt/slides/slide18.xml><?xml version="1.0" encoding="utf-8"?>
+<file path=ppt/slides/slide17.xml><?xml version="1.0" encoding="utf-8"?>
 <p:sld xmlns:a="http://schemas.openxmlformats.org/drawingml/2006/main" xmlns:r="http://schemas.openxmlformats.org/officeDocument/2006/relationships" xmlns:p="http://schemas.openxmlformats.org/presentationml/2006/main">
   <p:cSld>
     <p:spTree>
@@ -25216,7 +25143,7 @@
 </p:sld>
 </file>
 
-<file path=ppt/slides/slide19.xml><?xml version="1.0" encoding="utf-8"?>
+<file path=ppt/slides/slide18.xml><?xml version="1.0" encoding="utf-8"?>
 <p:sld xmlns:a="http://schemas.openxmlformats.org/drawingml/2006/main" xmlns:r="http://schemas.openxmlformats.org/officeDocument/2006/relationships" xmlns:p="http://schemas.openxmlformats.org/presentationml/2006/main">
   <p:cSld>
     <p:spTree>
@@ -26069,6 +25996,66 @@
     <p:extLst>
       <p:ext uri="{BB962C8B-B14F-4D97-AF65-F5344CB8AC3E}">
         <p14:creationId xmlns:p14="http://schemas.microsoft.com/office/powerpoint/2010/main" val="3159178290"/>
+      </p:ext>
+    </p:extLst>
+  </p:cSld>
+  <p:clrMapOvr>
+    <a:masterClrMapping/>
+  </p:clrMapOvr>
+  <p:timing>
+    <p:tnLst>
+      <p:par>
+        <p:cTn id="1" dur="indefinite" restart="never" nodeType="tmRoot"/>
+      </p:par>
+    </p:tnLst>
+  </p:timing>
+</p:sld>
+</file>
+
+<file path=ppt/slides/slide19.xml><?xml version="1.0" encoding="utf-8"?>
+<p:sld xmlns:a="http://schemas.openxmlformats.org/drawingml/2006/main" xmlns:r="http://schemas.openxmlformats.org/officeDocument/2006/relationships" xmlns:p="http://schemas.openxmlformats.org/presentationml/2006/main">
+  <p:cSld>
+    <p:spTree>
+      <p:nvGrpSpPr>
+        <p:cNvPr id="1" name=""/>
+        <p:cNvGrpSpPr/>
+        <p:nvPr/>
+      </p:nvGrpSpPr>
+      <p:grpSpPr>
+        <a:xfrm>
+          <a:off x="0" y="0"/>
+          <a:ext cx="0" cy="0"/>
+          <a:chOff x="0" y="0"/>
+          <a:chExt cx="0" cy="0"/>
+        </a:xfrm>
+      </p:grpSpPr>
+      <p:sp>
+        <p:nvSpPr>
+          <p:cNvPr id="4" name="Title 3"/>
+          <p:cNvSpPr>
+            <a:spLocks noGrp="1"/>
+          </p:cNvSpPr>
+          <p:nvPr>
+            <p:ph type="title"/>
+          </p:nvPr>
+        </p:nvSpPr>
+        <p:spPr/>
+        <p:txBody>
+          <a:bodyPr/>
+          <a:lstStyle/>
+          <a:p>
+            <a:r>
+              <a:rPr lang="en-US" dirty="0" smtClean="0"/>
+              <a:t>Creating a New WCF Service Library</a:t>
+            </a:r>
+            <a:endParaRPr lang="en-US" b="1" dirty="0"/>
+          </a:p>
+        </p:txBody>
+      </p:sp>
+    </p:spTree>
+    <p:extLst>
+      <p:ext uri="{BB962C8B-B14F-4D97-AF65-F5344CB8AC3E}">
+        <p14:creationId xmlns:p14="http://schemas.microsoft.com/office/powerpoint/2010/main" val="3869194016"/>
       </p:ext>
     </p:extLst>
   </p:cSld>
@@ -26243,66 +26230,6 @@
       </p:grpSpPr>
       <p:sp>
         <p:nvSpPr>
-          <p:cNvPr id="4" name="Title 3"/>
-          <p:cNvSpPr>
-            <a:spLocks noGrp="1"/>
-          </p:cNvSpPr>
-          <p:nvPr>
-            <p:ph type="title"/>
-          </p:nvPr>
-        </p:nvSpPr>
-        <p:spPr/>
-        <p:txBody>
-          <a:bodyPr/>
-          <a:lstStyle/>
-          <a:p>
-            <a:r>
-              <a:rPr lang="en-US" dirty="0" smtClean="0"/>
-              <a:t>Creating a New WCF Service Library</a:t>
-            </a:r>
-            <a:endParaRPr lang="en-US" b="1" dirty="0"/>
-          </a:p>
-        </p:txBody>
-      </p:sp>
-    </p:spTree>
-    <p:extLst>
-      <p:ext uri="{BB962C8B-B14F-4D97-AF65-F5344CB8AC3E}">
-        <p14:creationId xmlns:p14="http://schemas.microsoft.com/office/powerpoint/2010/main" val="3869194016"/>
-      </p:ext>
-    </p:extLst>
-  </p:cSld>
-  <p:clrMapOvr>
-    <a:masterClrMapping/>
-  </p:clrMapOvr>
-  <p:timing>
-    <p:tnLst>
-      <p:par>
-        <p:cTn id="1" dur="indefinite" restart="never" nodeType="tmRoot"/>
-      </p:par>
-    </p:tnLst>
-  </p:timing>
-</p:sld>
-</file>
-
-<file path=ppt/slides/slide21.xml><?xml version="1.0" encoding="utf-8"?>
-<p:sld xmlns:a="http://schemas.openxmlformats.org/drawingml/2006/main" xmlns:r="http://schemas.openxmlformats.org/officeDocument/2006/relationships" xmlns:p="http://schemas.openxmlformats.org/presentationml/2006/main">
-  <p:cSld>
-    <p:spTree>
-      <p:nvGrpSpPr>
-        <p:cNvPr id="1" name=""/>
-        <p:cNvGrpSpPr/>
-        <p:nvPr/>
-      </p:nvGrpSpPr>
-      <p:grpSpPr>
-        <a:xfrm>
-          <a:off x="0" y="0"/>
-          <a:ext cx="0" cy="0"/>
-          <a:chOff x="0" y="0"/>
-          <a:chExt cx="0" cy="0"/>
-        </a:xfrm>
-      </p:grpSpPr>
-      <p:sp>
-        <p:nvSpPr>
           <p:cNvPr id="5" name="Text Placeholder 4"/>
           <p:cNvSpPr>
             <a:spLocks noGrp="1"/>
@@ -26367,7 +26294,7 @@
 </p:sld>
 </file>
 
-<file path=ppt/slides/slide22.xml><?xml version="1.0" encoding="utf-8"?>
+<file path=ppt/slides/slide21.xml><?xml version="1.0" encoding="utf-8"?>
 <p:sld xmlns:a="http://schemas.openxmlformats.org/drawingml/2006/main" xmlns:r="http://schemas.openxmlformats.org/officeDocument/2006/relationships" xmlns:p="http://schemas.openxmlformats.org/presentationml/2006/main">
   <p:cSld>
     <p:spTree>
@@ -26824,7 +26751,7 @@
 </p:sld>
 </file>
 
-<file path=ppt/slides/slide23.xml><?xml version="1.0" encoding="utf-8"?>
+<file path=ppt/slides/slide22.xml><?xml version="1.0" encoding="utf-8"?>
 <p:sld xmlns:a="http://schemas.openxmlformats.org/drawingml/2006/main" xmlns:r="http://schemas.openxmlformats.org/officeDocument/2006/relationships" xmlns:p="http://schemas.openxmlformats.org/presentationml/2006/main">
   <p:cSld>
     <p:spTree>
@@ -27007,7 +26934,7 @@
 </p:sld>
 </file>
 
-<file path=ppt/slides/slide24.xml><?xml version="1.0" encoding="utf-8"?>
+<file path=ppt/slides/slide23.xml><?xml version="1.0" encoding="utf-8"?>
 <p:sld xmlns:a="http://schemas.openxmlformats.org/drawingml/2006/main" xmlns:r="http://schemas.openxmlformats.org/officeDocument/2006/relationships" xmlns:p="http://schemas.openxmlformats.org/presentationml/2006/main">
   <p:cSld>
     <p:spTree>
@@ -27090,7 +27017,7 @@
 </p:sld>
 </file>
 
-<file path=ppt/slides/slide25.xml><?xml version="1.0" encoding="utf-8"?>
+<file path=ppt/slides/slide24.xml><?xml version="1.0" encoding="utf-8"?>
 <p:sld xmlns:a="http://schemas.openxmlformats.org/drawingml/2006/main" xmlns:r="http://schemas.openxmlformats.org/officeDocument/2006/relationships" xmlns:p="http://schemas.openxmlformats.org/presentationml/2006/main">
   <p:cSld>
     <p:spTree>
@@ -27279,7 +27206,7 @@
 </p:sld>
 </file>
 
-<file path=ppt/slides/slide26.xml><?xml version="1.0" encoding="utf-8"?>
+<file path=ppt/slides/slide25.xml><?xml version="1.0" encoding="utf-8"?>
 <p:sld xmlns:a="http://schemas.openxmlformats.org/drawingml/2006/main" xmlns:r="http://schemas.openxmlformats.org/officeDocument/2006/relationships" xmlns:p="http://schemas.openxmlformats.org/presentationml/2006/main">
   <p:cSld>
     <p:spTree>
@@ -27947,7 +27874,7 @@
 </p:sld>
 </file>
 
-<file path=ppt/slides/slide27.xml><?xml version="1.0" encoding="utf-8"?>
+<file path=ppt/slides/slide26.xml><?xml version="1.0" encoding="utf-8"?>
 <p:sld xmlns:a="http://schemas.openxmlformats.org/drawingml/2006/main" xmlns:r="http://schemas.openxmlformats.org/officeDocument/2006/relationships" xmlns:p="http://schemas.openxmlformats.org/presentationml/2006/main">
   <p:cSld>
     <p:spTree>
@@ -28941,7 +28868,7 @@
 </p:sld>
 </file>
 
-<file path=ppt/slides/slide28.xml><?xml version="1.0" encoding="utf-8"?>
+<file path=ppt/slides/slide27.xml><?xml version="1.0" encoding="utf-8"?>
 <p:sld xmlns:a="http://schemas.openxmlformats.org/drawingml/2006/main" xmlns:r="http://schemas.openxmlformats.org/officeDocument/2006/relationships" xmlns:p="http://schemas.openxmlformats.org/presentationml/2006/main">
   <p:cSld>
     <p:spTree>
@@ -29281,7 +29208,7 @@
 </p:sld>
 </file>
 
-<file path=ppt/slides/slide29.xml><?xml version="1.0" encoding="utf-8"?>
+<file path=ppt/slides/slide28.xml><?xml version="1.0" encoding="utf-8"?>
 <p:sld xmlns:a="http://schemas.openxmlformats.org/drawingml/2006/main" xmlns:r="http://schemas.openxmlformats.org/officeDocument/2006/relationships" xmlns:p="http://schemas.openxmlformats.org/presentationml/2006/main">
   <p:cSld>
     <p:spTree>
@@ -29364,148 +29291,7 @@
 </p:sld>
 </file>
 
-<file path=ppt/slides/slide3.xml><?xml version="1.0" encoding="utf-8"?>
-<p:sld xmlns:a="http://schemas.openxmlformats.org/drawingml/2006/main" xmlns:r="http://schemas.openxmlformats.org/officeDocument/2006/relationships" xmlns:p="http://schemas.openxmlformats.org/presentationml/2006/main">
-  <p:cSld>
-    <p:spTree>
-      <p:nvGrpSpPr>
-        <p:cNvPr id="1" name=""/>
-        <p:cNvGrpSpPr/>
-        <p:nvPr/>
-      </p:nvGrpSpPr>
-      <p:grpSpPr>
-        <a:xfrm>
-          <a:off x="0" y="0"/>
-          <a:ext cx="0" cy="0"/>
-          <a:chOff x="0" y="0"/>
-          <a:chExt cx="0" cy="0"/>
-        </a:xfrm>
-      </p:grpSpPr>
-      <p:sp>
-        <p:nvSpPr>
-          <p:cNvPr id="2" name="Title 1"/>
-          <p:cNvSpPr>
-            <a:spLocks noGrp="1"/>
-          </p:cNvSpPr>
-          <p:nvPr>
-            <p:ph type="title"/>
-          </p:nvPr>
-        </p:nvSpPr>
-        <p:spPr/>
-        <p:txBody>
-          <a:bodyPr/>
-          <a:lstStyle/>
-          <a:p>
-            <a:r>
-              <a:rPr lang="en-US" sz="4000" dirty="0" smtClean="0"/>
-              <a:t>Meet </a:t>
-            </a:r>
-            <a:r>
-              <a:rPr lang="en-US" sz="4000" dirty="0" err="1" smtClean="0"/>
-              <a:t>BretStateham</a:t>
-            </a:r>
-            <a:r>
-              <a:rPr lang="en-US" sz="4000" dirty="0" smtClean="0"/>
-              <a:t> | @</a:t>
-            </a:r>
-            <a:r>
-              <a:rPr lang="en-US" sz="4000" dirty="0" err="1" smtClean="0"/>
-              <a:t>BretStateham</a:t>
-            </a:r>
-            <a:r>
-              <a:rPr lang="en-US" sz="4000" dirty="0" smtClean="0"/>
-              <a:t>‏</a:t>
-            </a:r>
-            <a:endParaRPr lang="en-US" dirty="0"/>
-          </a:p>
-        </p:txBody>
-      </p:sp>
-      <p:sp>
-        <p:nvSpPr>
-          <p:cNvPr id="7" name="Content Placeholder 6"/>
-          <p:cNvSpPr>
-            <a:spLocks noGrp="1"/>
-          </p:cNvSpPr>
-          <p:nvPr>
-            <p:ph idx="10"/>
-          </p:nvPr>
-        </p:nvSpPr>
-        <p:spPr/>
-        <p:txBody>
-          <a:bodyPr/>
-          <a:lstStyle/>
-          <a:p>
-            <a:r>
-              <a:rPr lang="en-US" dirty="0" smtClean="0"/>
-              <a:t>Find me on the Web at </a:t>
-            </a:r>
-            <a:r>
-              <a:rPr lang="en-US" dirty="0" smtClean="0">
-                <a:hlinkClick r:id="rId3"/>
-              </a:rPr>
-              <a:t>BretStateham.com</a:t>
-            </a:r>
-            <a:r>
-              <a:rPr lang="en-US" dirty="0" smtClean="0"/>
-              <a:t>  </a:t>
-            </a:r>
-          </a:p>
-          <a:p>
-            <a:r>
-              <a:rPr lang="en-US" dirty="0" smtClean="0"/>
-              <a:t>Working with the web since before IIS</a:t>
-            </a:r>
-          </a:p>
-          <a:p>
-            <a:r>
-              <a:rPr lang="en-US" dirty="0" smtClean="0"/>
-              <a:t>Working with .NET since before .NET</a:t>
-            </a:r>
-          </a:p>
-          <a:p>
-            <a:r>
-              <a:rPr lang="en-US" dirty="0" smtClean="0"/>
-              <a:t>In love with SQL Server (don’t tell my wife)</a:t>
-            </a:r>
-            <a:endParaRPr lang="en-US" dirty="0"/>
-          </a:p>
-          <a:p>
-            <a:pPr marL="0" indent="0">
-              <a:buNone/>
-            </a:pPr>
-            <a:endParaRPr lang="en-US" dirty="0" smtClean="0"/>
-          </a:p>
-        </p:txBody>
-      </p:sp>
-    </p:spTree>
-    <p:extLst>
-      <p:ext uri="{BB962C8B-B14F-4D97-AF65-F5344CB8AC3E}">
-        <p14:creationId xmlns:p14="http://schemas.microsoft.com/office/powerpoint/2010/main" val="634016936"/>
-      </p:ext>
-    </p:extLst>
-  </p:cSld>
-  <p:clrMapOvr>
-    <a:masterClrMapping/>
-  </p:clrMapOvr>
-  <mc:AlternateContent xmlns:mc="http://schemas.openxmlformats.org/markup-compatibility/2006" xmlns:p14="http://schemas.microsoft.com/office/powerpoint/2010/main">
-    <mc:Choice Requires="p14">
-      <p:transition spd="slow" p14:dur="2000"/>
-    </mc:Choice>
-    <mc:Fallback xmlns="">
-      <p:transition spd="slow"/>
-    </mc:Fallback>
-  </mc:AlternateContent>
-  <p:timing>
-    <p:tnLst>
-      <p:par>
-        <p:cTn id="1" dur="indefinite" restart="never" nodeType="tmRoot"/>
-      </p:par>
-    </p:tnLst>
-  </p:timing>
-</p:sld>
-</file>
-
-<file path=ppt/slides/slide30.xml><?xml version="1.0" encoding="utf-8"?>
+<file path=ppt/slides/slide29.xml><?xml version="1.0" encoding="utf-8"?>
 <p:sld xmlns:a="http://schemas.openxmlformats.org/drawingml/2006/main" xmlns:r="http://schemas.openxmlformats.org/officeDocument/2006/relationships" xmlns:p="http://schemas.openxmlformats.org/presentationml/2006/main">
   <p:cSld>
     <p:spTree>
@@ -30911,7 +30697,148 @@
 </p:sld>
 </file>
 
-<file path=ppt/slides/slide31.xml><?xml version="1.0" encoding="utf-8"?>
+<file path=ppt/slides/slide3.xml><?xml version="1.0" encoding="utf-8"?>
+<p:sld xmlns:a="http://schemas.openxmlformats.org/drawingml/2006/main" xmlns:r="http://schemas.openxmlformats.org/officeDocument/2006/relationships" xmlns:p="http://schemas.openxmlformats.org/presentationml/2006/main">
+  <p:cSld>
+    <p:spTree>
+      <p:nvGrpSpPr>
+        <p:cNvPr id="1" name=""/>
+        <p:cNvGrpSpPr/>
+        <p:nvPr/>
+      </p:nvGrpSpPr>
+      <p:grpSpPr>
+        <a:xfrm>
+          <a:off x="0" y="0"/>
+          <a:ext cx="0" cy="0"/>
+          <a:chOff x="0" y="0"/>
+          <a:chExt cx="0" cy="0"/>
+        </a:xfrm>
+      </p:grpSpPr>
+      <p:sp>
+        <p:nvSpPr>
+          <p:cNvPr id="2" name="Title 1"/>
+          <p:cNvSpPr>
+            <a:spLocks noGrp="1"/>
+          </p:cNvSpPr>
+          <p:nvPr>
+            <p:ph type="title"/>
+          </p:nvPr>
+        </p:nvSpPr>
+        <p:spPr/>
+        <p:txBody>
+          <a:bodyPr/>
+          <a:lstStyle/>
+          <a:p>
+            <a:r>
+              <a:rPr lang="en-US" sz="4000" dirty="0" smtClean="0"/>
+              <a:t>Meet </a:t>
+            </a:r>
+            <a:r>
+              <a:rPr lang="en-US" sz="4000" dirty="0" err="1" smtClean="0"/>
+              <a:t>BretStateham</a:t>
+            </a:r>
+            <a:r>
+              <a:rPr lang="en-US" sz="4000" dirty="0" smtClean="0"/>
+              <a:t> | @</a:t>
+            </a:r>
+            <a:r>
+              <a:rPr lang="en-US" sz="4000" dirty="0" err="1" smtClean="0"/>
+              <a:t>BretStateham</a:t>
+            </a:r>
+            <a:r>
+              <a:rPr lang="en-US" sz="4000" dirty="0" smtClean="0"/>
+              <a:t>‏</a:t>
+            </a:r>
+            <a:endParaRPr lang="en-US" dirty="0"/>
+          </a:p>
+        </p:txBody>
+      </p:sp>
+      <p:sp>
+        <p:nvSpPr>
+          <p:cNvPr id="7" name="Content Placeholder 6"/>
+          <p:cNvSpPr>
+            <a:spLocks noGrp="1"/>
+          </p:cNvSpPr>
+          <p:nvPr>
+            <p:ph idx="10"/>
+          </p:nvPr>
+        </p:nvSpPr>
+        <p:spPr/>
+        <p:txBody>
+          <a:bodyPr/>
+          <a:lstStyle/>
+          <a:p>
+            <a:r>
+              <a:rPr lang="en-US" dirty="0" smtClean="0"/>
+              <a:t>Find me on the Web at </a:t>
+            </a:r>
+            <a:r>
+              <a:rPr lang="en-US" dirty="0" smtClean="0">
+                <a:hlinkClick r:id="rId3"/>
+              </a:rPr>
+              <a:t>BretStateham.com</a:t>
+            </a:r>
+            <a:r>
+              <a:rPr lang="en-US" dirty="0" smtClean="0"/>
+              <a:t>  </a:t>
+            </a:r>
+          </a:p>
+          <a:p>
+            <a:r>
+              <a:rPr lang="en-US" dirty="0" smtClean="0"/>
+              <a:t>Working with the web since before IIS</a:t>
+            </a:r>
+          </a:p>
+          <a:p>
+            <a:r>
+              <a:rPr lang="en-US" dirty="0" smtClean="0"/>
+              <a:t>Working with .NET since before .NET</a:t>
+            </a:r>
+          </a:p>
+          <a:p>
+            <a:r>
+              <a:rPr lang="en-US" dirty="0" smtClean="0"/>
+              <a:t>In love with SQL Server (don’t tell my wife)</a:t>
+            </a:r>
+            <a:endParaRPr lang="en-US" dirty="0"/>
+          </a:p>
+          <a:p>
+            <a:pPr marL="0" indent="0">
+              <a:buNone/>
+            </a:pPr>
+            <a:endParaRPr lang="en-US" dirty="0" smtClean="0"/>
+          </a:p>
+        </p:txBody>
+      </p:sp>
+    </p:spTree>
+    <p:extLst>
+      <p:ext uri="{BB962C8B-B14F-4D97-AF65-F5344CB8AC3E}">
+        <p14:creationId xmlns:p14="http://schemas.microsoft.com/office/powerpoint/2010/main" val="634016936"/>
+      </p:ext>
+    </p:extLst>
+  </p:cSld>
+  <p:clrMapOvr>
+    <a:masterClrMapping/>
+  </p:clrMapOvr>
+  <mc:AlternateContent xmlns:mc="http://schemas.openxmlformats.org/markup-compatibility/2006" xmlns:p14="http://schemas.microsoft.com/office/powerpoint/2010/main">
+    <mc:Choice Requires="p14">
+      <p:transition spd="slow" p14:dur="2000"/>
+    </mc:Choice>
+    <mc:Fallback xmlns="">
+      <p:transition spd="slow"/>
+    </mc:Fallback>
+  </mc:AlternateContent>
+  <p:timing>
+    <p:tnLst>
+      <p:par>
+        <p:cTn id="1" dur="indefinite" restart="never" nodeType="tmRoot"/>
+      </p:par>
+    </p:tnLst>
+  </p:timing>
+</p:sld>
+</file>
+
+<file path=ppt/slides/slide30.xml><?xml version="1.0" encoding="utf-8"?>
 <p:sld xmlns:a="http://schemas.openxmlformats.org/drawingml/2006/main" xmlns:r="http://schemas.openxmlformats.org/officeDocument/2006/relationships" xmlns:p="http://schemas.openxmlformats.org/presentationml/2006/main">
   <p:cSld>
     <p:spTree>
@@ -31449,7 +31376,7 @@
 </p:sld>
 </file>
 
-<file path=ppt/slides/slide32.xml><?xml version="1.0" encoding="utf-8"?>
+<file path=ppt/slides/slide31.xml><?xml version="1.0" encoding="utf-8"?>
 <p:sld xmlns:a="http://schemas.openxmlformats.org/drawingml/2006/main" xmlns:r="http://schemas.openxmlformats.org/officeDocument/2006/relationships" xmlns:p="http://schemas.openxmlformats.org/presentationml/2006/main">
   <p:cSld>
     <p:spTree>
@@ -33164,7 +33091,7 @@
 </p:sld>
 </file>
 
-<file path=ppt/slides/slide33.xml><?xml version="1.0" encoding="utf-8"?>
+<file path=ppt/slides/slide32.xml><?xml version="1.0" encoding="utf-8"?>
 <p:sld xmlns:a="http://schemas.openxmlformats.org/drawingml/2006/main" xmlns:r="http://schemas.openxmlformats.org/officeDocument/2006/relationships" xmlns:p="http://schemas.openxmlformats.org/presentationml/2006/main">
   <p:cSld>
     <p:spTree>
@@ -33522,7 +33449,7 @@
 </p:sld>
 </file>
 
-<file path=ppt/slides/slide34.xml><?xml version="1.0" encoding="utf-8"?>
+<file path=ppt/slides/slide33.xml><?xml version="1.0" encoding="utf-8"?>
 <p:sld xmlns:a="http://schemas.openxmlformats.org/drawingml/2006/main" xmlns:r="http://schemas.openxmlformats.org/officeDocument/2006/relationships" xmlns:p="http://schemas.openxmlformats.org/presentationml/2006/main">
   <p:cSld>
     <p:spTree>
@@ -33605,7 +33532,7 @@
 </p:sld>
 </file>
 
-<file path=ppt/slides/slide35.xml><?xml version="1.0" encoding="utf-8"?>
+<file path=ppt/slides/slide34.xml><?xml version="1.0" encoding="utf-8"?>
 <p:sld xmlns:a="http://schemas.openxmlformats.org/drawingml/2006/main" xmlns:r="http://schemas.openxmlformats.org/officeDocument/2006/relationships" xmlns:p="http://schemas.openxmlformats.org/presentationml/2006/main">
   <p:cSld>
     <p:spTree>
@@ -34477,7 +34404,7 @@
 </p:sld>
 </file>
 
-<file path=ppt/slides/slide36.xml><?xml version="1.0" encoding="utf-8"?>
+<file path=ppt/slides/slide35.xml><?xml version="1.0" encoding="utf-8"?>
 <p:sld xmlns:a="http://schemas.openxmlformats.org/drawingml/2006/main" xmlns:r="http://schemas.openxmlformats.org/officeDocument/2006/relationships" xmlns:p="http://schemas.openxmlformats.org/presentationml/2006/main">
   <p:cSld>
     <p:spTree>
@@ -35562,7 +35489,7 @@
 </p:sld>
 </file>
 
-<file path=ppt/slides/slide37.xml><?xml version="1.0" encoding="utf-8"?>
+<file path=ppt/slides/slide36.xml><?xml version="1.0" encoding="utf-8"?>
 <p:sld xmlns:a="http://schemas.openxmlformats.org/drawingml/2006/main" xmlns:r="http://schemas.openxmlformats.org/officeDocument/2006/relationships" xmlns:p="http://schemas.openxmlformats.org/presentationml/2006/main">
   <p:cSld>
     <p:spTree>
@@ -36691,7 +36618,7 @@
 </p:sld>
 </file>
 
-<file path=ppt/slides/slide38.xml><?xml version="1.0" encoding="utf-8"?>
+<file path=ppt/slides/slide37.xml><?xml version="1.0" encoding="utf-8"?>
 <p:sld xmlns:a="http://schemas.openxmlformats.org/drawingml/2006/main" xmlns:r="http://schemas.openxmlformats.org/officeDocument/2006/relationships" xmlns:p="http://schemas.openxmlformats.org/presentationml/2006/main">
   <p:cSld>
     <p:spTree>
@@ -37307,7 +37234,7 @@
 </p:sld>
 </file>
 
-<file path=ppt/slides/slide39.xml><?xml version="1.0" encoding="utf-8"?>
+<file path=ppt/slides/slide38.xml><?xml version="1.0" encoding="utf-8"?>
 <p:sld xmlns:a="http://schemas.openxmlformats.org/drawingml/2006/main" xmlns:r="http://schemas.openxmlformats.org/officeDocument/2006/relationships" xmlns:p="http://schemas.openxmlformats.org/presentationml/2006/main">
   <p:cSld>
     <p:spTree>
@@ -38349,6 +38276,921 @@
     <p:extLst>
       <p:ext uri="{BB962C8B-B14F-4D97-AF65-F5344CB8AC3E}">
         <p14:creationId xmlns:p14="http://schemas.microsoft.com/office/powerpoint/2010/main" val="3780766584"/>
+      </p:ext>
+    </p:extLst>
+  </p:cSld>
+  <p:clrMapOvr>
+    <a:masterClrMapping/>
+  </p:clrMapOvr>
+  <p:timing>
+    <p:tnLst>
+      <p:par>
+        <p:cTn id="1" dur="indefinite" restart="never" nodeType="tmRoot"/>
+      </p:par>
+    </p:tnLst>
+  </p:timing>
+</p:sld>
+</file>
+
+<file path=ppt/slides/slide39.xml><?xml version="1.0" encoding="utf-8"?>
+<p:sld xmlns:a="http://schemas.openxmlformats.org/drawingml/2006/main" xmlns:r="http://schemas.openxmlformats.org/officeDocument/2006/relationships" xmlns:p="http://schemas.openxmlformats.org/presentationml/2006/main">
+  <p:cSld>
+    <p:spTree>
+      <p:nvGrpSpPr>
+        <p:cNvPr id="1" name=""/>
+        <p:cNvGrpSpPr/>
+        <p:nvPr/>
+      </p:nvGrpSpPr>
+      <p:grpSpPr>
+        <a:xfrm>
+          <a:off x="0" y="0"/>
+          <a:ext cx="0" cy="0"/>
+          <a:chOff x="0" y="0"/>
+          <a:chExt cx="0" cy="0"/>
+        </a:xfrm>
+      </p:grpSpPr>
+      <p:sp>
+        <p:nvSpPr>
+          <p:cNvPr id="2" name="Rectangle 1"/>
+          <p:cNvSpPr/>
+          <p:nvPr/>
+        </p:nvSpPr>
+        <p:spPr>
+          <a:xfrm>
+            <a:off x="490631" y="265414"/>
+            <a:ext cx="11429226" cy="1384995"/>
+          </a:xfrm>
+          <a:prstGeom prst="rect">
+            <a:avLst/>
+          </a:prstGeom>
+        </p:spPr>
+        <p:txBody>
+          <a:bodyPr wrap="square">
+            <a:spAutoFit/>
+          </a:bodyPr>
+          <a:lstStyle/>
+          <a:p>
+            <a:r>
+              <a:rPr lang="en-US" sz="2800" b="1" dirty="0" smtClean="0"/>
+              <a:t>Bindings - Encoding</a:t>
+            </a:r>
+          </a:p>
+          <a:p>
+            <a:endParaRPr lang="en-US" sz="2800" b="1" dirty="0" smtClean="0"/>
+          </a:p>
+          <a:p>
+            <a:endParaRPr lang="en-US" sz="2800" dirty="0"/>
+          </a:p>
+        </p:txBody>
+      </p:sp>
+      <p:graphicFrame>
+        <p:nvGraphicFramePr>
+          <p:cNvPr id="7" name="Table 6"/>
+          <p:cNvGraphicFramePr>
+            <a:graphicFrameLocks noGrp="1"/>
+          </p:cNvGraphicFramePr>
+          <p:nvPr>
+            <p:extLst/>
+          </p:nvPr>
+        </p:nvGraphicFramePr>
+        <p:xfrm>
+          <a:off x="490631" y="941748"/>
+          <a:ext cx="11255055" cy="5633559"/>
+        </p:xfrm>
+        <a:graphic>
+          <a:graphicData uri="http://schemas.openxmlformats.org/drawingml/2006/table">
+            <a:tbl>
+              <a:tblPr/>
+              <a:tblGrid>
+                <a:gridCol w="11255055"/>
+              </a:tblGrid>
+              <a:tr h="1529309">
+                <a:tc>
+                  <a:txBody>
+                    <a:bodyPr/>
+                    <a:lstStyle/>
+                    <a:p>
+                      <a:r>
+                        <a:rPr lang="en-US" sz="2600" b="1" dirty="0" smtClean="0">
+                          <a:effectLst/>
+                        </a:rPr>
+                        <a:t>Text</a:t>
+                      </a:r>
+                      <a:endParaRPr lang="en-US" sz="2600" b="1" dirty="0">
+                        <a:effectLst/>
+                      </a:endParaRPr>
+                    </a:p>
+                  </a:txBody>
+                  <a:tcPr marL="76200" marR="76200" marT="38100" marB="38100">
+                    <a:lnL w="7620" cap="flat" cmpd="sng" algn="ctr">
+                      <a:solidFill>
+                        <a:srgbClr val="000000"/>
+                      </a:solidFill>
+                      <a:prstDash val="solid"/>
+                      <a:round/>
+                      <a:headEnd type="none" w="med" len="med"/>
+                      <a:tailEnd type="none" w="med" len="med"/>
+                    </a:lnL>
+                    <a:lnR w="7620" cap="flat" cmpd="sng" algn="ctr">
+                      <a:solidFill>
+                        <a:srgbClr val="666666"/>
+                      </a:solidFill>
+                      <a:prstDash val="solid"/>
+                      <a:round/>
+                      <a:headEnd type="none" w="med" len="med"/>
+                      <a:tailEnd type="none" w="med" len="med"/>
+                    </a:lnR>
+                    <a:lnT w="7620" cap="flat" cmpd="sng" algn="ctr">
+                      <a:solidFill>
+                        <a:srgbClr val="000000"/>
+                      </a:solidFill>
+                      <a:prstDash val="solid"/>
+                      <a:round/>
+                      <a:headEnd type="none" w="med" len="med"/>
+                      <a:tailEnd type="none" w="med" len="med"/>
+                    </a:lnT>
+                    <a:lnB w="7620" cap="flat" cmpd="sng" algn="ctr">
+                      <a:solidFill>
+                        <a:srgbClr val="000000"/>
+                      </a:solidFill>
+                      <a:prstDash val="solid"/>
+                      <a:round/>
+                      <a:headEnd type="none" w="med" len="med"/>
+                      <a:tailEnd type="none" w="med" len="med"/>
+                    </a:lnB>
+                    <a:solidFill>
+                      <a:srgbClr val="DDFFAA"/>
+                    </a:solidFill>
+                  </a:tcPr>
+                </a:tc>
+              </a:tr>
+              <a:tr h="1549085">
+                <a:tc>
+                  <a:txBody>
+                    <a:bodyPr/>
+                    <a:lstStyle/>
+                    <a:p>
+                      <a:r>
+                        <a:rPr lang="en-US" sz="2600" b="1" dirty="0" smtClean="0">
+                          <a:effectLst/>
+                        </a:rPr>
+                        <a:t>Binary</a:t>
+                      </a:r>
+                    </a:p>
+                    <a:p>
+                      <a:endParaRPr lang="en-US" sz="2600" b="1" dirty="0" smtClean="0">
+                        <a:effectLst/>
+                      </a:endParaRPr>
+                    </a:p>
+                    <a:p>
+                      <a:endParaRPr lang="en-US" sz="2600" b="1" dirty="0" smtClean="0">
+                        <a:effectLst/>
+                      </a:endParaRPr>
+                    </a:p>
+                    <a:p>
+                      <a:endParaRPr lang="en-US" sz="2600" b="1" dirty="0">
+                        <a:effectLst/>
+                      </a:endParaRPr>
+                    </a:p>
+                  </a:txBody>
+                  <a:tcPr marL="76200" marR="76200" marT="38100" marB="38100">
+                    <a:lnL w="7620" cap="flat" cmpd="sng" algn="ctr">
+                      <a:solidFill>
+                        <a:srgbClr val="000000"/>
+                      </a:solidFill>
+                      <a:prstDash val="solid"/>
+                      <a:round/>
+                      <a:headEnd type="none" w="med" len="med"/>
+                      <a:tailEnd type="none" w="med" len="med"/>
+                    </a:lnL>
+                    <a:lnR w="7620" cap="flat" cmpd="sng" algn="ctr">
+                      <a:solidFill>
+                        <a:srgbClr val="666666"/>
+                      </a:solidFill>
+                      <a:prstDash val="solid"/>
+                      <a:round/>
+                      <a:headEnd type="none" w="med" len="med"/>
+                      <a:tailEnd type="none" w="med" len="med"/>
+                    </a:lnR>
+                    <a:lnT w="7620" cap="flat" cmpd="sng" algn="ctr">
+                      <a:solidFill>
+                        <a:srgbClr val="000000"/>
+                      </a:solidFill>
+                      <a:prstDash val="solid"/>
+                      <a:round/>
+                      <a:headEnd type="none" w="med" len="med"/>
+                      <a:tailEnd type="none" w="med" len="med"/>
+                    </a:lnT>
+                    <a:lnB w="7620" cap="flat" cmpd="sng" algn="ctr">
+                      <a:solidFill>
+                        <a:srgbClr val="000000"/>
+                      </a:solidFill>
+                      <a:prstDash val="solid"/>
+                      <a:round/>
+                      <a:headEnd type="none" w="med" len="med"/>
+                      <a:tailEnd type="none" w="med" len="med"/>
+                    </a:lnB>
+                    <a:solidFill>
+                      <a:srgbClr val="FFFFFF"/>
+                    </a:solidFill>
+                  </a:tcPr>
+                </a:tc>
+              </a:tr>
+              <a:tr h="2443090">
+                <a:tc>
+                  <a:txBody>
+                    <a:bodyPr/>
+                    <a:lstStyle/>
+                    <a:p>
+                      <a:r>
+                        <a:rPr lang="en-US" sz="2600" b="1" dirty="0" smtClean="0">
+                          <a:effectLst/>
+                        </a:rPr>
+                        <a:t>MTOM</a:t>
+                      </a:r>
+                      <a:endParaRPr lang="en-US" sz="2600" b="1" dirty="0">
+                        <a:effectLst/>
+                      </a:endParaRPr>
+                    </a:p>
+                  </a:txBody>
+                  <a:tcPr marL="76200" marR="76200" marT="38100" marB="38100">
+                    <a:lnL w="7620" cap="flat" cmpd="sng" algn="ctr">
+                      <a:solidFill>
+                        <a:srgbClr val="000000"/>
+                      </a:solidFill>
+                      <a:prstDash val="solid"/>
+                      <a:round/>
+                      <a:headEnd type="none" w="med" len="med"/>
+                      <a:tailEnd type="none" w="med" len="med"/>
+                    </a:lnL>
+                    <a:lnR w="7620" cap="flat" cmpd="sng" algn="ctr">
+                      <a:solidFill>
+                        <a:srgbClr val="666666"/>
+                      </a:solidFill>
+                      <a:prstDash val="solid"/>
+                      <a:round/>
+                      <a:headEnd type="none" w="med" len="med"/>
+                      <a:tailEnd type="none" w="med" len="med"/>
+                    </a:lnR>
+                    <a:lnT w="7620" cap="flat" cmpd="sng" algn="ctr">
+                      <a:solidFill>
+                        <a:srgbClr val="000000"/>
+                      </a:solidFill>
+                      <a:prstDash val="solid"/>
+                      <a:round/>
+                      <a:headEnd type="none" w="med" len="med"/>
+                      <a:tailEnd type="none" w="med" len="med"/>
+                    </a:lnT>
+                    <a:lnB w="7620" cap="flat" cmpd="sng" algn="ctr">
+                      <a:solidFill>
+                        <a:srgbClr val="000000"/>
+                      </a:solidFill>
+                      <a:prstDash val="solid"/>
+                      <a:round/>
+                      <a:headEnd type="none" w="med" len="med"/>
+                      <a:tailEnd type="none" w="med" len="med"/>
+                    </a:lnB>
+                    <a:solidFill>
+                      <a:srgbClr val="DDFFAA"/>
+                    </a:solidFill>
+                  </a:tcPr>
+                </a:tc>
+              </a:tr>
+            </a:tbl>
+          </a:graphicData>
+        </a:graphic>
+      </p:graphicFrame>
+      <p:graphicFrame>
+        <p:nvGraphicFramePr>
+          <p:cNvPr id="3" name="Table 2"/>
+          <p:cNvGraphicFramePr>
+            <a:graphicFrameLocks noGrp="1"/>
+          </p:cNvGraphicFramePr>
+          <p:nvPr>
+            <p:extLst/>
+          </p:nvPr>
+        </p:nvGraphicFramePr>
+        <p:xfrm>
+          <a:off x="990600" y="1495402"/>
+          <a:ext cx="10515600" cy="701040"/>
+        </p:xfrm>
+        <a:graphic>
+          <a:graphicData uri="http://schemas.openxmlformats.org/drawingml/2006/table">
+            <a:tbl>
+              <a:tblPr/>
+              <a:tblGrid>
+                <a:gridCol w="10515600"/>
+              </a:tblGrid>
+              <a:tr h="198120">
+                <a:tc>
+                  <a:txBody>
+                    <a:bodyPr/>
+                    <a:lstStyle/>
+                    <a:p>
+                      <a:r>
+                        <a:rPr lang="en-US" dirty="0">
+                          <a:effectLst/>
+                        </a:rPr>
+                        <a:t>Uses base64 encoding, which can make </a:t>
+                      </a:r>
+                      <a:r>
+                        <a:rPr lang="en-US" b="1" dirty="0">
+                          <a:effectLst/>
+                        </a:rPr>
+                        <a:t>messages up to 30% bigger</a:t>
+                      </a:r>
+                      <a:r>
+                        <a:rPr lang="en-US" dirty="0">
+                          <a:effectLst/>
+                        </a:rPr>
+                        <a:t>. </a:t>
+                      </a:r>
+                    </a:p>
+                  </a:txBody>
+                  <a:tcPr marL="76200" marR="76200" marT="38100" marB="38100" anchor="ctr">
+                    <a:lnL w="7620" cap="flat" cmpd="sng" algn="ctr">
+                      <a:solidFill>
+                        <a:srgbClr val="000000"/>
+                      </a:solidFill>
+                      <a:prstDash val="solid"/>
+                      <a:round/>
+                      <a:headEnd type="none" w="med" len="med"/>
+                      <a:tailEnd type="none" w="med" len="med"/>
+                    </a:lnL>
+                    <a:lnR w="7620" cap="flat" cmpd="sng" algn="ctr">
+                      <a:solidFill>
+                        <a:srgbClr val="666666"/>
+                      </a:solidFill>
+                      <a:prstDash val="solid"/>
+                      <a:round/>
+                      <a:headEnd type="none" w="med" len="med"/>
+                      <a:tailEnd type="none" w="med" len="med"/>
+                    </a:lnR>
+                    <a:lnT w="7620" cap="flat" cmpd="sng" algn="ctr">
+                      <a:solidFill>
+                        <a:srgbClr val="000000"/>
+                      </a:solidFill>
+                      <a:prstDash val="solid"/>
+                      <a:round/>
+                      <a:headEnd type="none" w="med" len="med"/>
+                      <a:tailEnd type="none" w="med" len="med"/>
+                    </a:lnT>
+                    <a:lnB w="7620" cap="flat" cmpd="sng" algn="ctr">
+                      <a:solidFill>
+                        <a:srgbClr val="000000"/>
+                      </a:solidFill>
+                      <a:prstDash val="solid"/>
+                      <a:round/>
+                      <a:headEnd type="none" w="med" len="med"/>
+                      <a:tailEnd type="none" w="med" len="med"/>
+                    </a:lnB>
+                    <a:solidFill>
+                      <a:srgbClr val="EBF3FF"/>
+                    </a:solidFill>
+                  </a:tcPr>
+                </a:tc>
+              </a:tr>
+              <a:tr h="198120">
+                <a:tc>
+                  <a:txBody>
+                    <a:bodyPr/>
+                    <a:lstStyle/>
+                    <a:p>
+                      <a:r>
+                        <a:rPr lang="en-US" dirty="0">
+                          <a:effectLst/>
+                        </a:rPr>
+                        <a:t>If you are sending </a:t>
+                      </a:r>
+                      <a:r>
+                        <a:rPr lang="en-US" b="1" dirty="0">
+                          <a:effectLst/>
+                        </a:rPr>
+                        <a:t>binary data</a:t>
+                      </a:r>
+                      <a:r>
+                        <a:rPr lang="en-US" dirty="0">
+                          <a:effectLst/>
+                        </a:rPr>
+                        <a:t>, this can introduce a </a:t>
+                      </a:r>
+                      <a:r>
+                        <a:rPr lang="en-US" b="1" dirty="0">
+                          <a:effectLst/>
+                        </a:rPr>
+                        <a:t>large amount of overhead</a:t>
+                      </a:r>
+                      <a:r>
+                        <a:rPr lang="en-US" dirty="0">
+                          <a:effectLst/>
+                        </a:rPr>
+                        <a:t>.</a:t>
+                      </a:r>
+                    </a:p>
+                  </a:txBody>
+                  <a:tcPr marL="76200" marR="76200" marT="38100" marB="38100" anchor="ctr">
+                    <a:lnL w="7620" cap="flat" cmpd="sng" algn="ctr">
+                      <a:solidFill>
+                        <a:srgbClr val="000000"/>
+                      </a:solidFill>
+                      <a:prstDash val="solid"/>
+                      <a:round/>
+                      <a:headEnd type="none" w="med" len="med"/>
+                      <a:tailEnd type="none" w="med" len="med"/>
+                    </a:lnL>
+                    <a:lnR w="7620" cap="flat" cmpd="sng" algn="ctr">
+                      <a:solidFill>
+                        <a:srgbClr val="666666"/>
+                      </a:solidFill>
+                      <a:prstDash val="solid"/>
+                      <a:round/>
+                      <a:headEnd type="none" w="med" len="med"/>
+                      <a:tailEnd type="none" w="med" len="med"/>
+                    </a:lnR>
+                    <a:lnT w="7620" cap="flat" cmpd="sng" algn="ctr">
+                      <a:solidFill>
+                        <a:srgbClr val="000000"/>
+                      </a:solidFill>
+                      <a:prstDash val="solid"/>
+                      <a:round/>
+                      <a:headEnd type="none" w="med" len="med"/>
+                      <a:tailEnd type="none" w="med" len="med"/>
+                    </a:lnT>
+                    <a:lnB w="7620" cap="flat" cmpd="sng" algn="ctr">
+                      <a:solidFill>
+                        <a:srgbClr val="666666"/>
+                      </a:solidFill>
+                      <a:prstDash val="solid"/>
+                      <a:round/>
+                      <a:headEnd type="none" w="med" len="med"/>
+                      <a:tailEnd type="none" w="med" len="med"/>
+                    </a:lnB>
+                    <a:solidFill>
+                      <a:srgbClr val="FFFFFF"/>
+                    </a:solidFill>
+                  </a:tcPr>
+                </a:tc>
+              </a:tr>
+            </a:tbl>
+          </a:graphicData>
+        </a:graphic>
+      </p:graphicFrame>
+      <p:graphicFrame>
+        <p:nvGraphicFramePr>
+          <p:cNvPr id="4" name="Table 3"/>
+          <p:cNvGraphicFramePr>
+            <a:graphicFrameLocks noGrp="1"/>
+          </p:cNvGraphicFramePr>
+          <p:nvPr>
+            <p:extLst/>
+          </p:nvPr>
+        </p:nvGraphicFramePr>
+        <p:xfrm>
+          <a:off x="925285" y="2947557"/>
+          <a:ext cx="10515600" cy="975360"/>
+        </p:xfrm>
+        <a:graphic>
+          <a:graphicData uri="http://schemas.openxmlformats.org/drawingml/2006/table">
+            <a:tbl>
+              <a:tblPr/>
+              <a:tblGrid>
+                <a:gridCol w="10515600"/>
+              </a:tblGrid>
+              <a:tr h="198120">
+                <a:tc>
+                  <a:txBody>
+                    <a:bodyPr/>
+                    <a:lstStyle/>
+                    <a:p>
+                      <a:r>
+                        <a:rPr lang="en-US" dirty="0">
+                          <a:effectLst/>
+                        </a:rPr>
+                        <a:t>This is the </a:t>
+                      </a:r>
+                      <a:r>
+                        <a:rPr lang="en-US" b="1" dirty="0">
+                          <a:effectLst/>
+                        </a:rPr>
+                        <a:t>fastest</a:t>
+                      </a:r>
+                      <a:r>
+                        <a:rPr lang="en-US" dirty="0">
+                          <a:effectLst/>
+                        </a:rPr>
+                        <a:t> encoding. </a:t>
+                      </a:r>
+                    </a:p>
+                  </a:txBody>
+                  <a:tcPr marL="76200" marR="76200" marT="38100" marB="38100" anchor="ctr">
+                    <a:lnL w="7620" cap="flat" cmpd="sng" algn="ctr">
+                      <a:solidFill>
+                        <a:srgbClr val="000000"/>
+                      </a:solidFill>
+                      <a:prstDash val="solid"/>
+                      <a:round/>
+                      <a:headEnd type="none" w="med" len="med"/>
+                      <a:tailEnd type="none" w="med" len="med"/>
+                    </a:lnL>
+                    <a:lnR w="7620" cap="flat" cmpd="sng" algn="ctr">
+                      <a:solidFill>
+                        <a:srgbClr val="666666"/>
+                      </a:solidFill>
+                      <a:prstDash val="solid"/>
+                      <a:round/>
+                      <a:headEnd type="none" w="med" len="med"/>
+                      <a:tailEnd type="none" w="med" len="med"/>
+                    </a:lnR>
+                    <a:lnT w="7620" cap="flat" cmpd="sng" algn="ctr">
+                      <a:solidFill>
+                        <a:srgbClr val="000000"/>
+                      </a:solidFill>
+                      <a:prstDash val="solid"/>
+                      <a:round/>
+                      <a:headEnd type="none" w="med" len="med"/>
+                      <a:tailEnd type="none" w="med" len="med"/>
+                    </a:lnT>
+                    <a:lnB w="7620" cap="flat" cmpd="sng" algn="ctr">
+                      <a:solidFill>
+                        <a:srgbClr val="000000"/>
+                      </a:solidFill>
+                      <a:prstDash val="solid"/>
+                      <a:round/>
+                      <a:headEnd type="none" w="med" len="med"/>
+                      <a:tailEnd type="none" w="med" len="med"/>
+                    </a:lnB>
+                    <a:solidFill>
+                      <a:srgbClr val="EBF3FF"/>
+                    </a:solidFill>
+                  </a:tcPr>
+                </a:tc>
+              </a:tr>
+              <a:tr h="198120">
+                <a:tc>
+                  <a:txBody>
+                    <a:bodyPr/>
+                    <a:lstStyle/>
+                    <a:p>
+                      <a:r>
+                        <a:rPr lang="en-US" b="1" dirty="0">
+                          <a:effectLst/>
+                        </a:rPr>
+                        <a:t>Unless you are sending very large messages</a:t>
+                      </a:r>
+                      <a:r>
+                        <a:rPr lang="en-US" dirty="0">
+                          <a:effectLst/>
+                        </a:rPr>
+                        <a:t>, the binary format is ideal (with the assumption that text isn’t needed for interoperability)</a:t>
+                      </a:r>
+                    </a:p>
+                  </a:txBody>
+                  <a:tcPr marL="76200" marR="76200" marT="38100" marB="38100" anchor="ctr">
+                    <a:lnL w="7620" cap="flat" cmpd="sng" algn="ctr">
+                      <a:solidFill>
+                        <a:srgbClr val="000000"/>
+                      </a:solidFill>
+                      <a:prstDash val="solid"/>
+                      <a:round/>
+                      <a:headEnd type="none" w="med" len="med"/>
+                      <a:tailEnd type="none" w="med" len="med"/>
+                    </a:lnL>
+                    <a:lnR w="7620" cap="flat" cmpd="sng" algn="ctr">
+                      <a:solidFill>
+                        <a:srgbClr val="666666"/>
+                      </a:solidFill>
+                      <a:prstDash val="solid"/>
+                      <a:round/>
+                      <a:headEnd type="none" w="med" len="med"/>
+                      <a:tailEnd type="none" w="med" len="med"/>
+                    </a:lnR>
+                    <a:lnT w="7620" cap="flat" cmpd="sng" algn="ctr">
+                      <a:solidFill>
+                        <a:srgbClr val="000000"/>
+                      </a:solidFill>
+                      <a:prstDash val="solid"/>
+                      <a:round/>
+                      <a:headEnd type="none" w="med" len="med"/>
+                      <a:tailEnd type="none" w="med" len="med"/>
+                    </a:lnT>
+                    <a:lnB w="7620" cap="flat" cmpd="sng" algn="ctr">
+                      <a:solidFill>
+                        <a:srgbClr val="666666"/>
+                      </a:solidFill>
+                      <a:prstDash val="solid"/>
+                      <a:round/>
+                      <a:headEnd type="none" w="med" len="med"/>
+                      <a:tailEnd type="none" w="med" len="med"/>
+                    </a:lnB>
+                    <a:solidFill>
+                      <a:srgbClr val="FFFFFF"/>
+                    </a:solidFill>
+                  </a:tcPr>
+                </a:tc>
+              </a:tr>
+            </a:tbl>
+          </a:graphicData>
+        </a:graphic>
+      </p:graphicFrame>
+      <p:graphicFrame>
+        <p:nvGraphicFramePr>
+          <p:cNvPr id="8" name="Table 7"/>
+          <p:cNvGraphicFramePr>
+            <a:graphicFrameLocks noGrp="1"/>
+          </p:cNvGraphicFramePr>
+          <p:nvPr>
+            <p:extLst/>
+          </p:nvPr>
+        </p:nvGraphicFramePr>
+        <p:xfrm>
+          <a:off x="870857" y="4593772"/>
+          <a:ext cx="10515600" cy="1676400"/>
+        </p:xfrm>
+        <a:graphic>
+          <a:graphicData uri="http://schemas.openxmlformats.org/drawingml/2006/table">
+            <a:tbl>
+              <a:tblPr/>
+              <a:tblGrid>
+                <a:gridCol w="10515600"/>
+              </a:tblGrid>
+              <a:tr h="198120">
+                <a:tc>
+                  <a:txBody>
+                    <a:bodyPr/>
+                    <a:lstStyle/>
+                    <a:p>
+                      <a:r>
+                        <a:rPr lang="en-US" dirty="0" smtClean="0">
+                          <a:effectLst/>
+                        </a:rPr>
+                        <a:t>Is for </a:t>
+                      </a:r>
+                      <a:r>
+                        <a:rPr lang="en-US" b="1" dirty="0">
+                          <a:effectLst/>
+                        </a:rPr>
+                        <a:t>large objects</a:t>
+                      </a:r>
+                    </a:p>
+                  </a:txBody>
+                  <a:tcPr marL="76200" marR="76200" marT="38100" marB="38100" anchor="ctr">
+                    <a:lnL w="7620" cap="flat" cmpd="sng" algn="ctr">
+                      <a:solidFill>
+                        <a:srgbClr val="000000"/>
+                      </a:solidFill>
+                      <a:prstDash val="solid"/>
+                      <a:round/>
+                      <a:headEnd type="none" w="med" len="med"/>
+                      <a:tailEnd type="none" w="med" len="med"/>
+                    </a:lnL>
+                    <a:lnR w="7620" cap="flat" cmpd="sng" algn="ctr">
+                      <a:solidFill>
+                        <a:srgbClr val="666666"/>
+                      </a:solidFill>
+                      <a:prstDash val="solid"/>
+                      <a:round/>
+                      <a:headEnd type="none" w="med" len="med"/>
+                      <a:tailEnd type="none" w="med" len="med"/>
+                    </a:lnR>
+                    <a:lnT w="7620" cap="flat" cmpd="sng" algn="ctr">
+                      <a:solidFill>
+                        <a:srgbClr val="000000"/>
+                      </a:solidFill>
+                      <a:prstDash val="solid"/>
+                      <a:round/>
+                      <a:headEnd type="none" w="med" len="med"/>
+                      <a:tailEnd type="none" w="med" len="med"/>
+                    </a:lnT>
+                    <a:lnB w="7620" cap="flat" cmpd="sng" algn="ctr">
+                      <a:solidFill>
+                        <a:srgbClr val="000000"/>
+                      </a:solidFill>
+                      <a:prstDash val="solid"/>
+                      <a:round/>
+                      <a:headEnd type="none" w="med" len="med"/>
+                      <a:tailEnd type="none" w="med" len="med"/>
+                    </a:lnB>
+                    <a:solidFill>
+                      <a:srgbClr val="EBF3FF"/>
+                    </a:solidFill>
+                  </a:tcPr>
+                </a:tc>
+              </a:tr>
+              <a:tr h="198120">
+                <a:tc>
+                  <a:txBody>
+                    <a:bodyPr/>
+                    <a:lstStyle/>
+                    <a:p>
+                      <a:r>
+                        <a:rPr lang="en-US" dirty="0">
+                          <a:effectLst/>
+                        </a:rPr>
+                        <a:t>MTOM is the W3C Message Transmission Optimization Mechanism, </a:t>
+                      </a:r>
+                      <a:r>
+                        <a:rPr lang="en-US" b="1" dirty="0">
+                          <a:effectLst/>
+                        </a:rPr>
+                        <a:t>a method of efficiently sending binary </a:t>
+                      </a:r>
+                      <a:r>
+                        <a:rPr lang="en-US" dirty="0">
+                          <a:effectLst/>
+                        </a:rPr>
+                        <a:t>data to and from Web services. </a:t>
+                      </a:r>
+                    </a:p>
+                  </a:txBody>
+                  <a:tcPr marL="76200" marR="76200" marT="38100" marB="38100" anchor="ctr">
+                    <a:lnL w="7620" cap="flat" cmpd="sng" algn="ctr">
+                      <a:solidFill>
+                        <a:srgbClr val="000000"/>
+                      </a:solidFill>
+                      <a:prstDash val="solid"/>
+                      <a:round/>
+                      <a:headEnd type="none" w="med" len="med"/>
+                      <a:tailEnd type="none" w="med" len="med"/>
+                    </a:lnL>
+                    <a:lnR w="7620" cap="flat" cmpd="sng" algn="ctr">
+                      <a:solidFill>
+                        <a:srgbClr val="666666"/>
+                      </a:solidFill>
+                      <a:prstDash val="solid"/>
+                      <a:round/>
+                      <a:headEnd type="none" w="med" len="med"/>
+                      <a:tailEnd type="none" w="med" len="med"/>
+                    </a:lnR>
+                    <a:lnT w="7620" cap="flat" cmpd="sng" algn="ctr">
+                      <a:solidFill>
+                        <a:srgbClr val="000000"/>
+                      </a:solidFill>
+                      <a:prstDash val="solid"/>
+                      <a:round/>
+                      <a:headEnd type="none" w="med" len="med"/>
+                      <a:tailEnd type="none" w="med" len="med"/>
+                    </a:lnT>
+                    <a:lnB w="7620" cap="flat" cmpd="sng" algn="ctr">
+                      <a:solidFill>
+                        <a:srgbClr val="000000"/>
+                      </a:solidFill>
+                      <a:prstDash val="solid"/>
+                      <a:round/>
+                      <a:headEnd type="none" w="med" len="med"/>
+                      <a:tailEnd type="none" w="med" len="med"/>
+                    </a:lnB>
+                    <a:solidFill>
+                      <a:srgbClr val="FFFFFF"/>
+                    </a:solidFill>
+                  </a:tcPr>
+                </a:tc>
+              </a:tr>
+              <a:tr h="198120">
+                <a:tc>
+                  <a:txBody>
+                    <a:bodyPr/>
+                    <a:lstStyle/>
+                    <a:p>
+                      <a:r>
+                        <a:rPr lang="en-US" dirty="0">
+                          <a:effectLst/>
+                        </a:rPr>
+                        <a:t>MTOM </a:t>
+                      </a:r>
+                      <a:r>
+                        <a:rPr lang="en-US" b="1" dirty="0">
+                          <a:effectLst/>
+                        </a:rPr>
+                        <a:t>doesn't use base64 encoding </a:t>
+                      </a:r>
+                      <a:r>
+                        <a:rPr lang="en-US" dirty="0">
+                          <a:effectLst/>
+                        </a:rPr>
+                        <a:t>for binary attachments </a:t>
+                      </a:r>
+                      <a:r>
+                        <a:rPr lang="en-US" b="1" dirty="0">
+                          <a:effectLst/>
+                        </a:rPr>
+                        <a:t>keeping the overall size small. </a:t>
+                      </a:r>
+                    </a:p>
+                  </a:txBody>
+                  <a:tcPr marL="76200" marR="76200" marT="38100" marB="38100" anchor="ctr">
+                    <a:lnL w="7620" cap="flat" cmpd="sng" algn="ctr">
+                      <a:solidFill>
+                        <a:srgbClr val="000000"/>
+                      </a:solidFill>
+                      <a:prstDash val="solid"/>
+                      <a:round/>
+                      <a:headEnd type="none" w="med" len="med"/>
+                      <a:tailEnd type="none" w="med" len="med"/>
+                    </a:lnL>
+                    <a:lnR w="7620" cap="flat" cmpd="sng" algn="ctr">
+                      <a:solidFill>
+                        <a:srgbClr val="666666"/>
+                      </a:solidFill>
+                      <a:prstDash val="solid"/>
+                      <a:round/>
+                      <a:headEnd type="none" w="med" len="med"/>
+                      <a:tailEnd type="none" w="med" len="med"/>
+                    </a:lnR>
+                    <a:lnT w="7620" cap="flat" cmpd="sng" algn="ctr">
+                      <a:solidFill>
+                        <a:srgbClr val="000000"/>
+                      </a:solidFill>
+                      <a:prstDash val="solid"/>
+                      <a:round/>
+                      <a:headEnd type="none" w="med" len="med"/>
+                      <a:tailEnd type="none" w="med" len="med"/>
+                    </a:lnT>
+                    <a:lnB w="7620" cap="flat" cmpd="sng" algn="ctr">
+                      <a:solidFill>
+                        <a:srgbClr val="000000"/>
+                      </a:solidFill>
+                      <a:prstDash val="solid"/>
+                      <a:round/>
+                      <a:headEnd type="none" w="med" len="med"/>
+                      <a:tailEnd type="none" w="med" len="med"/>
+                    </a:lnB>
+                    <a:solidFill>
+                      <a:srgbClr val="EBF3FF"/>
+                    </a:solidFill>
+                  </a:tcPr>
+                </a:tc>
+              </a:tr>
+              <a:tr h="198120">
+                <a:tc>
+                  <a:txBody>
+                    <a:bodyPr/>
+                    <a:lstStyle/>
+                    <a:p>
+                      <a:r>
+                        <a:rPr lang="en-US" dirty="0">
+                          <a:effectLst/>
+                        </a:rPr>
+                        <a:t>MTOM is based on open specifications &amp; hence is </a:t>
+                      </a:r>
+                      <a:r>
+                        <a:rPr lang="en-US" b="1" dirty="0">
+                          <a:effectLst/>
+                        </a:rPr>
+                        <a:t>largely interoperable.</a:t>
+                      </a:r>
+                    </a:p>
+                  </a:txBody>
+                  <a:tcPr marL="76200" marR="76200" marT="38100" marB="38100" anchor="ctr">
+                    <a:lnL w="7620" cap="flat" cmpd="sng" algn="ctr">
+                      <a:solidFill>
+                        <a:srgbClr val="000000"/>
+                      </a:solidFill>
+                      <a:prstDash val="solid"/>
+                      <a:round/>
+                      <a:headEnd type="none" w="med" len="med"/>
+                      <a:tailEnd type="none" w="med" len="med"/>
+                    </a:lnL>
+                    <a:lnR w="7620" cap="flat" cmpd="sng" algn="ctr">
+                      <a:solidFill>
+                        <a:srgbClr val="666666"/>
+                      </a:solidFill>
+                      <a:prstDash val="solid"/>
+                      <a:round/>
+                      <a:headEnd type="none" w="med" len="med"/>
+                      <a:tailEnd type="none" w="med" len="med"/>
+                    </a:lnR>
+                    <a:lnT w="7620" cap="flat" cmpd="sng" algn="ctr">
+                      <a:solidFill>
+                        <a:srgbClr val="000000"/>
+                      </a:solidFill>
+                      <a:prstDash val="solid"/>
+                      <a:round/>
+                      <a:headEnd type="none" w="med" len="med"/>
+                      <a:tailEnd type="none" w="med" len="med"/>
+                    </a:lnT>
+                    <a:lnB w="7620" cap="flat" cmpd="sng" algn="ctr">
+                      <a:solidFill>
+                        <a:srgbClr val="666666"/>
+                      </a:solidFill>
+                      <a:prstDash val="solid"/>
+                      <a:round/>
+                      <a:headEnd type="none" w="med" len="med"/>
+                      <a:tailEnd type="none" w="med" len="med"/>
+                    </a:lnB>
+                    <a:solidFill>
+                      <a:srgbClr val="FFFFFF"/>
+                    </a:solidFill>
+                  </a:tcPr>
+                </a:tc>
+              </a:tr>
+            </a:tbl>
+          </a:graphicData>
+        </a:graphic>
+      </p:graphicFrame>
+    </p:spTree>
+    <p:extLst>
+      <p:ext uri="{BB962C8B-B14F-4D97-AF65-F5344CB8AC3E}">
+        <p14:creationId xmlns:p14="http://schemas.microsoft.com/office/powerpoint/2010/main" val="2617310481"/>
       </p:ext>
     </p:extLst>
   </p:cSld>
@@ -38808,921 +39650,6 @@
         </p:nvSpPr>
         <p:spPr>
           <a:xfrm>
-            <a:off x="490631" y="265414"/>
-            <a:ext cx="11429226" cy="1384995"/>
-          </a:xfrm>
-          <a:prstGeom prst="rect">
-            <a:avLst/>
-          </a:prstGeom>
-        </p:spPr>
-        <p:txBody>
-          <a:bodyPr wrap="square">
-            <a:spAutoFit/>
-          </a:bodyPr>
-          <a:lstStyle/>
-          <a:p>
-            <a:r>
-              <a:rPr lang="en-US" sz="2800" b="1" dirty="0" smtClean="0"/>
-              <a:t>Bindings - Encoding</a:t>
-            </a:r>
-          </a:p>
-          <a:p>
-            <a:endParaRPr lang="en-US" sz="2800" b="1" dirty="0" smtClean="0"/>
-          </a:p>
-          <a:p>
-            <a:endParaRPr lang="en-US" sz="2800" dirty="0"/>
-          </a:p>
-        </p:txBody>
-      </p:sp>
-      <p:graphicFrame>
-        <p:nvGraphicFramePr>
-          <p:cNvPr id="7" name="Table 6"/>
-          <p:cNvGraphicFramePr>
-            <a:graphicFrameLocks noGrp="1"/>
-          </p:cNvGraphicFramePr>
-          <p:nvPr>
-            <p:extLst/>
-          </p:nvPr>
-        </p:nvGraphicFramePr>
-        <p:xfrm>
-          <a:off x="490631" y="941748"/>
-          <a:ext cx="11255055" cy="5633559"/>
-        </p:xfrm>
-        <a:graphic>
-          <a:graphicData uri="http://schemas.openxmlformats.org/drawingml/2006/table">
-            <a:tbl>
-              <a:tblPr/>
-              <a:tblGrid>
-                <a:gridCol w="11255055"/>
-              </a:tblGrid>
-              <a:tr h="1529309">
-                <a:tc>
-                  <a:txBody>
-                    <a:bodyPr/>
-                    <a:lstStyle/>
-                    <a:p>
-                      <a:r>
-                        <a:rPr lang="en-US" sz="2600" b="1" dirty="0" smtClean="0">
-                          <a:effectLst/>
-                        </a:rPr>
-                        <a:t>Text</a:t>
-                      </a:r>
-                      <a:endParaRPr lang="en-US" sz="2600" b="1" dirty="0">
-                        <a:effectLst/>
-                      </a:endParaRPr>
-                    </a:p>
-                  </a:txBody>
-                  <a:tcPr marL="76200" marR="76200" marT="38100" marB="38100">
-                    <a:lnL w="7620" cap="flat" cmpd="sng" algn="ctr">
-                      <a:solidFill>
-                        <a:srgbClr val="000000"/>
-                      </a:solidFill>
-                      <a:prstDash val="solid"/>
-                      <a:round/>
-                      <a:headEnd type="none" w="med" len="med"/>
-                      <a:tailEnd type="none" w="med" len="med"/>
-                    </a:lnL>
-                    <a:lnR w="7620" cap="flat" cmpd="sng" algn="ctr">
-                      <a:solidFill>
-                        <a:srgbClr val="666666"/>
-                      </a:solidFill>
-                      <a:prstDash val="solid"/>
-                      <a:round/>
-                      <a:headEnd type="none" w="med" len="med"/>
-                      <a:tailEnd type="none" w="med" len="med"/>
-                    </a:lnR>
-                    <a:lnT w="7620" cap="flat" cmpd="sng" algn="ctr">
-                      <a:solidFill>
-                        <a:srgbClr val="000000"/>
-                      </a:solidFill>
-                      <a:prstDash val="solid"/>
-                      <a:round/>
-                      <a:headEnd type="none" w="med" len="med"/>
-                      <a:tailEnd type="none" w="med" len="med"/>
-                    </a:lnT>
-                    <a:lnB w="7620" cap="flat" cmpd="sng" algn="ctr">
-                      <a:solidFill>
-                        <a:srgbClr val="000000"/>
-                      </a:solidFill>
-                      <a:prstDash val="solid"/>
-                      <a:round/>
-                      <a:headEnd type="none" w="med" len="med"/>
-                      <a:tailEnd type="none" w="med" len="med"/>
-                    </a:lnB>
-                    <a:solidFill>
-                      <a:srgbClr val="DDFFAA"/>
-                    </a:solidFill>
-                  </a:tcPr>
-                </a:tc>
-              </a:tr>
-              <a:tr h="1549085">
-                <a:tc>
-                  <a:txBody>
-                    <a:bodyPr/>
-                    <a:lstStyle/>
-                    <a:p>
-                      <a:r>
-                        <a:rPr lang="en-US" sz="2600" b="1" dirty="0" smtClean="0">
-                          <a:effectLst/>
-                        </a:rPr>
-                        <a:t>Binary</a:t>
-                      </a:r>
-                    </a:p>
-                    <a:p>
-                      <a:endParaRPr lang="en-US" sz="2600" b="1" dirty="0" smtClean="0">
-                        <a:effectLst/>
-                      </a:endParaRPr>
-                    </a:p>
-                    <a:p>
-                      <a:endParaRPr lang="en-US" sz="2600" b="1" dirty="0" smtClean="0">
-                        <a:effectLst/>
-                      </a:endParaRPr>
-                    </a:p>
-                    <a:p>
-                      <a:endParaRPr lang="en-US" sz="2600" b="1" dirty="0">
-                        <a:effectLst/>
-                      </a:endParaRPr>
-                    </a:p>
-                  </a:txBody>
-                  <a:tcPr marL="76200" marR="76200" marT="38100" marB="38100">
-                    <a:lnL w="7620" cap="flat" cmpd="sng" algn="ctr">
-                      <a:solidFill>
-                        <a:srgbClr val="000000"/>
-                      </a:solidFill>
-                      <a:prstDash val="solid"/>
-                      <a:round/>
-                      <a:headEnd type="none" w="med" len="med"/>
-                      <a:tailEnd type="none" w="med" len="med"/>
-                    </a:lnL>
-                    <a:lnR w="7620" cap="flat" cmpd="sng" algn="ctr">
-                      <a:solidFill>
-                        <a:srgbClr val="666666"/>
-                      </a:solidFill>
-                      <a:prstDash val="solid"/>
-                      <a:round/>
-                      <a:headEnd type="none" w="med" len="med"/>
-                      <a:tailEnd type="none" w="med" len="med"/>
-                    </a:lnR>
-                    <a:lnT w="7620" cap="flat" cmpd="sng" algn="ctr">
-                      <a:solidFill>
-                        <a:srgbClr val="000000"/>
-                      </a:solidFill>
-                      <a:prstDash val="solid"/>
-                      <a:round/>
-                      <a:headEnd type="none" w="med" len="med"/>
-                      <a:tailEnd type="none" w="med" len="med"/>
-                    </a:lnT>
-                    <a:lnB w="7620" cap="flat" cmpd="sng" algn="ctr">
-                      <a:solidFill>
-                        <a:srgbClr val="000000"/>
-                      </a:solidFill>
-                      <a:prstDash val="solid"/>
-                      <a:round/>
-                      <a:headEnd type="none" w="med" len="med"/>
-                      <a:tailEnd type="none" w="med" len="med"/>
-                    </a:lnB>
-                    <a:solidFill>
-                      <a:srgbClr val="FFFFFF"/>
-                    </a:solidFill>
-                  </a:tcPr>
-                </a:tc>
-              </a:tr>
-              <a:tr h="2443090">
-                <a:tc>
-                  <a:txBody>
-                    <a:bodyPr/>
-                    <a:lstStyle/>
-                    <a:p>
-                      <a:r>
-                        <a:rPr lang="en-US" sz="2600" b="1" dirty="0" smtClean="0">
-                          <a:effectLst/>
-                        </a:rPr>
-                        <a:t>MTOM</a:t>
-                      </a:r>
-                      <a:endParaRPr lang="en-US" sz="2600" b="1" dirty="0">
-                        <a:effectLst/>
-                      </a:endParaRPr>
-                    </a:p>
-                  </a:txBody>
-                  <a:tcPr marL="76200" marR="76200" marT="38100" marB="38100">
-                    <a:lnL w="7620" cap="flat" cmpd="sng" algn="ctr">
-                      <a:solidFill>
-                        <a:srgbClr val="000000"/>
-                      </a:solidFill>
-                      <a:prstDash val="solid"/>
-                      <a:round/>
-                      <a:headEnd type="none" w="med" len="med"/>
-                      <a:tailEnd type="none" w="med" len="med"/>
-                    </a:lnL>
-                    <a:lnR w="7620" cap="flat" cmpd="sng" algn="ctr">
-                      <a:solidFill>
-                        <a:srgbClr val="666666"/>
-                      </a:solidFill>
-                      <a:prstDash val="solid"/>
-                      <a:round/>
-                      <a:headEnd type="none" w="med" len="med"/>
-                      <a:tailEnd type="none" w="med" len="med"/>
-                    </a:lnR>
-                    <a:lnT w="7620" cap="flat" cmpd="sng" algn="ctr">
-                      <a:solidFill>
-                        <a:srgbClr val="000000"/>
-                      </a:solidFill>
-                      <a:prstDash val="solid"/>
-                      <a:round/>
-                      <a:headEnd type="none" w="med" len="med"/>
-                      <a:tailEnd type="none" w="med" len="med"/>
-                    </a:lnT>
-                    <a:lnB w="7620" cap="flat" cmpd="sng" algn="ctr">
-                      <a:solidFill>
-                        <a:srgbClr val="000000"/>
-                      </a:solidFill>
-                      <a:prstDash val="solid"/>
-                      <a:round/>
-                      <a:headEnd type="none" w="med" len="med"/>
-                      <a:tailEnd type="none" w="med" len="med"/>
-                    </a:lnB>
-                    <a:solidFill>
-                      <a:srgbClr val="DDFFAA"/>
-                    </a:solidFill>
-                  </a:tcPr>
-                </a:tc>
-              </a:tr>
-            </a:tbl>
-          </a:graphicData>
-        </a:graphic>
-      </p:graphicFrame>
-      <p:graphicFrame>
-        <p:nvGraphicFramePr>
-          <p:cNvPr id="3" name="Table 2"/>
-          <p:cNvGraphicFramePr>
-            <a:graphicFrameLocks noGrp="1"/>
-          </p:cNvGraphicFramePr>
-          <p:nvPr>
-            <p:extLst/>
-          </p:nvPr>
-        </p:nvGraphicFramePr>
-        <p:xfrm>
-          <a:off x="990600" y="1495402"/>
-          <a:ext cx="10515600" cy="701040"/>
-        </p:xfrm>
-        <a:graphic>
-          <a:graphicData uri="http://schemas.openxmlformats.org/drawingml/2006/table">
-            <a:tbl>
-              <a:tblPr/>
-              <a:tblGrid>
-                <a:gridCol w="10515600"/>
-              </a:tblGrid>
-              <a:tr h="198120">
-                <a:tc>
-                  <a:txBody>
-                    <a:bodyPr/>
-                    <a:lstStyle/>
-                    <a:p>
-                      <a:r>
-                        <a:rPr lang="en-US" dirty="0">
-                          <a:effectLst/>
-                        </a:rPr>
-                        <a:t>Uses base64 encoding, which can make </a:t>
-                      </a:r>
-                      <a:r>
-                        <a:rPr lang="en-US" b="1" dirty="0">
-                          <a:effectLst/>
-                        </a:rPr>
-                        <a:t>messages up to 30% bigger</a:t>
-                      </a:r>
-                      <a:r>
-                        <a:rPr lang="en-US" dirty="0">
-                          <a:effectLst/>
-                        </a:rPr>
-                        <a:t>. </a:t>
-                      </a:r>
-                    </a:p>
-                  </a:txBody>
-                  <a:tcPr marL="76200" marR="76200" marT="38100" marB="38100" anchor="ctr">
-                    <a:lnL w="7620" cap="flat" cmpd="sng" algn="ctr">
-                      <a:solidFill>
-                        <a:srgbClr val="000000"/>
-                      </a:solidFill>
-                      <a:prstDash val="solid"/>
-                      <a:round/>
-                      <a:headEnd type="none" w="med" len="med"/>
-                      <a:tailEnd type="none" w="med" len="med"/>
-                    </a:lnL>
-                    <a:lnR w="7620" cap="flat" cmpd="sng" algn="ctr">
-                      <a:solidFill>
-                        <a:srgbClr val="666666"/>
-                      </a:solidFill>
-                      <a:prstDash val="solid"/>
-                      <a:round/>
-                      <a:headEnd type="none" w="med" len="med"/>
-                      <a:tailEnd type="none" w="med" len="med"/>
-                    </a:lnR>
-                    <a:lnT w="7620" cap="flat" cmpd="sng" algn="ctr">
-                      <a:solidFill>
-                        <a:srgbClr val="000000"/>
-                      </a:solidFill>
-                      <a:prstDash val="solid"/>
-                      <a:round/>
-                      <a:headEnd type="none" w="med" len="med"/>
-                      <a:tailEnd type="none" w="med" len="med"/>
-                    </a:lnT>
-                    <a:lnB w="7620" cap="flat" cmpd="sng" algn="ctr">
-                      <a:solidFill>
-                        <a:srgbClr val="000000"/>
-                      </a:solidFill>
-                      <a:prstDash val="solid"/>
-                      <a:round/>
-                      <a:headEnd type="none" w="med" len="med"/>
-                      <a:tailEnd type="none" w="med" len="med"/>
-                    </a:lnB>
-                    <a:solidFill>
-                      <a:srgbClr val="EBF3FF"/>
-                    </a:solidFill>
-                  </a:tcPr>
-                </a:tc>
-              </a:tr>
-              <a:tr h="198120">
-                <a:tc>
-                  <a:txBody>
-                    <a:bodyPr/>
-                    <a:lstStyle/>
-                    <a:p>
-                      <a:r>
-                        <a:rPr lang="en-US" dirty="0">
-                          <a:effectLst/>
-                        </a:rPr>
-                        <a:t>If you are sending </a:t>
-                      </a:r>
-                      <a:r>
-                        <a:rPr lang="en-US" b="1" dirty="0">
-                          <a:effectLst/>
-                        </a:rPr>
-                        <a:t>binary data</a:t>
-                      </a:r>
-                      <a:r>
-                        <a:rPr lang="en-US" dirty="0">
-                          <a:effectLst/>
-                        </a:rPr>
-                        <a:t>, this can introduce a </a:t>
-                      </a:r>
-                      <a:r>
-                        <a:rPr lang="en-US" b="1" dirty="0">
-                          <a:effectLst/>
-                        </a:rPr>
-                        <a:t>large amount of overhead</a:t>
-                      </a:r>
-                      <a:r>
-                        <a:rPr lang="en-US" dirty="0">
-                          <a:effectLst/>
-                        </a:rPr>
-                        <a:t>.</a:t>
-                      </a:r>
-                    </a:p>
-                  </a:txBody>
-                  <a:tcPr marL="76200" marR="76200" marT="38100" marB="38100" anchor="ctr">
-                    <a:lnL w="7620" cap="flat" cmpd="sng" algn="ctr">
-                      <a:solidFill>
-                        <a:srgbClr val="000000"/>
-                      </a:solidFill>
-                      <a:prstDash val="solid"/>
-                      <a:round/>
-                      <a:headEnd type="none" w="med" len="med"/>
-                      <a:tailEnd type="none" w="med" len="med"/>
-                    </a:lnL>
-                    <a:lnR w="7620" cap="flat" cmpd="sng" algn="ctr">
-                      <a:solidFill>
-                        <a:srgbClr val="666666"/>
-                      </a:solidFill>
-                      <a:prstDash val="solid"/>
-                      <a:round/>
-                      <a:headEnd type="none" w="med" len="med"/>
-                      <a:tailEnd type="none" w="med" len="med"/>
-                    </a:lnR>
-                    <a:lnT w="7620" cap="flat" cmpd="sng" algn="ctr">
-                      <a:solidFill>
-                        <a:srgbClr val="000000"/>
-                      </a:solidFill>
-                      <a:prstDash val="solid"/>
-                      <a:round/>
-                      <a:headEnd type="none" w="med" len="med"/>
-                      <a:tailEnd type="none" w="med" len="med"/>
-                    </a:lnT>
-                    <a:lnB w="7620" cap="flat" cmpd="sng" algn="ctr">
-                      <a:solidFill>
-                        <a:srgbClr val="666666"/>
-                      </a:solidFill>
-                      <a:prstDash val="solid"/>
-                      <a:round/>
-                      <a:headEnd type="none" w="med" len="med"/>
-                      <a:tailEnd type="none" w="med" len="med"/>
-                    </a:lnB>
-                    <a:solidFill>
-                      <a:srgbClr val="FFFFFF"/>
-                    </a:solidFill>
-                  </a:tcPr>
-                </a:tc>
-              </a:tr>
-            </a:tbl>
-          </a:graphicData>
-        </a:graphic>
-      </p:graphicFrame>
-      <p:graphicFrame>
-        <p:nvGraphicFramePr>
-          <p:cNvPr id="4" name="Table 3"/>
-          <p:cNvGraphicFramePr>
-            <a:graphicFrameLocks noGrp="1"/>
-          </p:cNvGraphicFramePr>
-          <p:nvPr>
-            <p:extLst/>
-          </p:nvPr>
-        </p:nvGraphicFramePr>
-        <p:xfrm>
-          <a:off x="925285" y="2947557"/>
-          <a:ext cx="10515600" cy="975360"/>
-        </p:xfrm>
-        <a:graphic>
-          <a:graphicData uri="http://schemas.openxmlformats.org/drawingml/2006/table">
-            <a:tbl>
-              <a:tblPr/>
-              <a:tblGrid>
-                <a:gridCol w="10515600"/>
-              </a:tblGrid>
-              <a:tr h="198120">
-                <a:tc>
-                  <a:txBody>
-                    <a:bodyPr/>
-                    <a:lstStyle/>
-                    <a:p>
-                      <a:r>
-                        <a:rPr lang="en-US" dirty="0">
-                          <a:effectLst/>
-                        </a:rPr>
-                        <a:t>This is the </a:t>
-                      </a:r>
-                      <a:r>
-                        <a:rPr lang="en-US" b="1" dirty="0">
-                          <a:effectLst/>
-                        </a:rPr>
-                        <a:t>fastest</a:t>
-                      </a:r>
-                      <a:r>
-                        <a:rPr lang="en-US" dirty="0">
-                          <a:effectLst/>
-                        </a:rPr>
-                        <a:t> encoding. </a:t>
-                      </a:r>
-                    </a:p>
-                  </a:txBody>
-                  <a:tcPr marL="76200" marR="76200" marT="38100" marB="38100" anchor="ctr">
-                    <a:lnL w="7620" cap="flat" cmpd="sng" algn="ctr">
-                      <a:solidFill>
-                        <a:srgbClr val="000000"/>
-                      </a:solidFill>
-                      <a:prstDash val="solid"/>
-                      <a:round/>
-                      <a:headEnd type="none" w="med" len="med"/>
-                      <a:tailEnd type="none" w="med" len="med"/>
-                    </a:lnL>
-                    <a:lnR w="7620" cap="flat" cmpd="sng" algn="ctr">
-                      <a:solidFill>
-                        <a:srgbClr val="666666"/>
-                      </a:solidFill>
-                      <a:prstDash val="solid"/>
-                      <a:round/>
-                      <a:headEnd type="none" w="med" len="med"/>
-                      <a:tailEnd type="none" w="med" len="med"/>
-                    </a:lnR>
-                    <a:lnT w="7620" cap="flat" cmpd="sng" algn="ctr">
-                      <a:solidFill>
-                        <a:srgbClr val="000000"/>
-                      </a:solidFill>
-                      <a:prstDash val="solid"/>
-                      <a:round/>
-                      <a:headEnd type="none" w="med" len="med"/>
-                      <a:tailEnd type="none" w="med" len="med"/>
-                    </a:lnT>
-                    <a:lnB w="7620" cap="flat" cmpd="sng" algn="ctr">
-                      <a:solidFill>
-                        <a:srgbClr val="000000"/>
-                      </a:solidFill>
-                      <a:prstDash val="solid"/>
-                      <a:round/>
-                      <a:headEnd type="none" w="med" len="med"/>
-                      <a:tailEnd type="none" w="med" len="med"/>
-                    </a:lnB>
-                    <a:solidFill>
-                      <a:srgbClr val="EBF3FF"/>
-                    </a:solidFill>
-                  </a:tcPr>
-                </a:tc>
-              </a:tr>
-              <a:tr h="198120">
-                <a:tc>
-                  <a:txBody>
-                    <a:bodyPr/>
-                    <a:lstStyle/>
-                    <a:p>
-                      <a:r>
-                        <a:rPr lang="en-US" b="1" dirty="0">
-                          <a:effectLst/>
-                        </a:rPr>
-                        <a:t>Unless you are sending very large messages</a:t>
-                      </a:r>
-                      <a:r>
-                        <a:rPr lang="en-US" dirty="0">
-                          <a:effectLst/>
-                        </a:rPr>
-                        <a:t>, the binary format is ideal (with the assumption that text isn’t needed for interoperability)</a:t>
-                      </a:r>
-                    </a:p>
-                  </a:txBody>
-                  <a:tcPr marL="76200" marR="76200" marT="38100" marB="38100" anchor="ctr">
-                    <a:lnL w="7620" cap="flat" cmpd="sng" algn="ctr">
-                      <a:solidFill>
-                        <a:srgbClr val="000000"/>
-                      </a:solidFill>
-                      <a:prstDash val="solid"/>
-                      <a:round/>
-                      <a:headEnd type="none" w="med" len="med"/>
-                      <a:tailEnd type="none" w="med" len="med"/>
-                    </a:lnL>
-                    <a:lnR w="7620" cap="flat" cmpd="sng" algn="ctr">
-                      <a:solidFill>
-                        <a:srgbClr val="666666"/>
-                      </a:solidFill>
-                      <a:prstDash val="solid"/>
-                      <a:round/>
-                      <a:headEnd type="none" w="med" len="med"/>
-                      <a:tailEnd type="none" w="med" len="med"/>
-                    </a:lnR>
-                    <a:lnT w="7620" cap="flat" cmpd="sng" algn="ctr">
-                      <a:solidFill>
-                        <a:srgbClr val="000000"/>
-                      </a:solidFill>
-                      <a:prstDash val="solid"/>
-                      <a:round/>
-                      <a:headEnd type="none" w="med" len="med"/>
-                      <a:tailEnd type="none" w="med" len="med"/>
-                    </a:lnT>
-                    <a:lnB w="7620" cap="flat" cmpd="sng" algn="ctr">
-                      <a:solidFill>
-                        <a:srgbClr val="666666"/>
-                      </a:solidFill>
-                      <a:prstDash val="solid"/>
-                      <a:round/>
-                      <a:headEnd type="none" w="med" len="med"/>
-                      <a:tailEnd type="none" w="med" len="med"/>
-                    </a:lnB>
-                    <a:solidFill>
-                      <a:srgbClr val="FFFFFF"/>
-                    </a:solidFill>
-                  </a:tcPr>
-                </a:tc>
-              </a:tr>
-            </a:tbl>
-          </a:graphicData>
-        </a:graphic>
-      </p:graphicFrame>
-      <p:graphicFrame>
-        <p:nvGraphicFramePr>
-          <p:cNvPr id="8" name="Table 7"/>
-          <p:cNvGraphicFramePr>
-            <a:graphicFrameLocks noGrp="1"/>
-          </p:cNvGraphicFramePr>
-          <p:nvPr>
-            <p:extLst/>
-          </p:nvPr>
-        </p:nvGraphicFramePr>
-        <p:xfrm>
-          <a:off x="870857" y="4593772"/>
-          <a:ext cx="10515600" cy="1676400"/>
-        </p:xfrm>
-        <a:graphic>
-          <a:graphicData uri="http://schemas.openxmlformats.org/drawingml/2006/table">
-            <a:tbl>
-              <a:tblPr/>
-              <a:tblGrid>
-                <a:gridCol w="10515600"/>
-              </a:tblGrid>
-              <a:tr h="198120">
-                <a:tc>
-                  <a:txBody>
-                    <a:bodyPr/>
-                    <a:lstStyle/>
-                    <a:p>
-                      <a:r>
-                        <a:rPr lang="en-US" dirty="0" smtClean="0">
-                          <a:effectLst/>
-                        </a:rPr>
-                        <a:t>Is for </a:t>
-                      </a:r>
-                      <a:r>
-                        <a:rPr lang="en-US" b="1" dirty="0">
-                          <a:effectLst/>
-                        </a:rPr>
-                        <a:t>large objects</a:t>
-                      </a:r>
-                    </a:p>
-                  </a:txBody>
-                  <a:tcPr marL="76200" marR="76200" marT="38100" marB="38100" anchor="ctr">
-                    <a:lnL w="7620" cap="flat" cmpd="sng" algn="ctr">
-                      <a:solidFill>
-                        <a:srgbClr val="000000"/>
-                      </a:solidFill>
-                      <a:prstDash val="solid"/>
-                      <a:round/>
-                      <a:headEnd type="none" w="med" len="med"/>
-                      <a:tailEnd type="none" w="med" len="med"/>
-                    </a:lnL>
-                    <a:lnR w="7620" cap="flat" cmpd="sng" algn="ctr">
-                      <a:solidFill>
-                        <a:srgbClr val="666666"/>
-                      </a:solidFill>
-                      <a:prstDash val="solid"/>
-                      <a:round/>
-                      <a:headEnd type="none" w="med" len="med"/>
-                      <a:tailEnd type="none" w="med" len="med"/>
-                    </a:lnR>
-                    <a:lnT w="7620" cap="flat" cmpd="sng" algn="ctr">
-                      <a:solidFill>
-                        <a:srgbClr val="000000"/>
-                      </a:solidFill>
-                      <a:prstDash val="solid"/>
-                      <a:round/>
-                      <a:headEnd type="none" w="med" len="med"/>
-                      <a:tailEnd type="none" w="med" len="med"/>
-                    </a:lnT>
-                    <a:lnB w="7620" cap="flat" cmpd="sng" algn="ctr">
-                      <a:solidFill>
-                        <a:srgbClr val="000000"/>
-                      </a:solidFill>
-                      <a:prstDash val="solid"/>
-                      <a:round/>
-                      <a:headEnd type="none" w="med" len="med"/>
-                      <a:tailEnd type="none" w="med" len="med"/>
-                    </a:lnB>
-                    <a:solidFill>
-                      <a:srgbClr val="EBF3FF"/>
-                    </a:solidFill>
-                  </a:tcPr>
-                </a:tc>
-              </a:tr>
-              <a:tr h="198120">
-                <a:tc>
-                  <a:txBody>
-                    <a:bodyPr/>
-                    <a:lstStyle/>
-                    <a:p>
-                      <a:r>
-                        <a:rPr lang="en-US" dirty="0">
-                          <a:effectLst/>
-                        </a:rPr>
-                        <a:t>MTOM is the W3C Message Transmission Optimization Mechanism, </a:t>
-                      </a:r>
-                      <a:r>
-                        <a:rPr lang="en-US" b="1" dirty="0">
-                          <a:effectLst/>
-                        </a:rPr>
-                        <a:t>a method of efficiently sending binary </a:t>
-                      </a:r>
-                      <a:r>
-                        <a:rPr lang="en-US" dirty="0">
-                          <a:effectLst/>
-                        </a:rPr>
-                        <a:t>data to and from Web services. </a:t>
-                      </a:r>
-                    </a:p>
-                  </a:txBody>
-                  <a:tcPr marL="76200" marR="76200" marT="38100" marB="38100" anchor="ctr">
-                    <a:lnL w="7620" cap="flat" cmpd="sng" algn="ctr">
-                      <a:solidFill>
-                        <a:srgbClr val="000000"/>
-                      </a:solidFill>
-                      <a:prstDash val="solid"/>
-                      <a:round/>
-                      <a:headEnd type="none" w="med" len="med"/>
-                      <a:tailEnd type="none" w="med" len="med"/>
-                    </a:lnL>
-                    <a:lnR w="7620" cap="flat" cmpd="sng" algn="ctr">
-                      <a:solidFill>
-                        <a:srgbClr val="666666"/>
-                      </a:solidFill>
-                      <a:prstDash val="solid"/>
-                      <a:round/>
-                      <a:headEnd type="none" w="med" len="med"/>
-                      <a:tailEnd type="none" w="med" len="med"/>
-                    </a:lnR>
-                    <a:lnT w="7620" cap="flat" cmpd="sng" algn="ctr">
-                      <a:solidFill>
-                        <a:srgbClr val="000000"/>
-                      </a:solidFill>
-                      <a:prstDash val="solid"/>
-                      <a:round/>
-                      <a:headEnd type="none" w="med" len="med"/>
-                      <a:tailEnd type="none" w="med" len="med"/>
-                    </a:lnT>
-                    <a:lnB w="7620" cap="flat" cmpd="sng" algn="ctr">
-                      <a:solidFill>
-                        <a:srgbClr val="000000"/>
-                      </a:solidFill>
-                      <a:prstDash val="solid"/>
-                      <a:round/>
-                      <a:headEnd type="none" w="med" len="med"/>
-                      <a:tailEnd type="none" w="med" len="med"/>
-                    </a:lnB>
-                    <a:solidFill>
-                      <a:srgbClr val="FFFFFF"/>
-                    </a:solidFill>
-                  </a:tcPr>
-                </a:tc>
-              </a:tr>
-              <a:tr h="198120">
-                <a:tc>
-                  <a:txBody>
-                    <a:bodyPr/>
-                    <a:lstStyle/>
-                    <a:p>
-                      <a:r>
-                        <a:rPr lang="en-US" dirty="0">
-                          <a:effectLst/>
-                        </a:rPr>
-                        <a:t>MTOM </a:t>
-                      </a:r>
-                      <a:r>
-                        <a:rPr lang="en-US" b="1" dirty="0">
-                          <a:effectLst/>
-                        </a:rPr>
-                        <a:t>doesn't use base64 encoding </a:t>
-                      </a:r>
-                      <a:r>
-                        <a:rPr lang="en-US" dirty="0">
-                          <a:effectLst/>
-                        </a:rPr>
-                        <a:t>for binary attachments </a:t>
-                      </a:r>
-                      <a:r>
-                        <a:rPr lang="en-US" b="1" dirty="0">
-                          <a:effectLst/>
-                        </a:rPr>
-                        <a:t>keeping the overall size small. </a:t>
-                      </a:r>
-                    </a:p>
-                  </a:txBody>
-                  <a:tcPr marL="76200" marR="76200" marT="38100" marB="38100" anchor="ctr">
-                    <a:lnL w="7620" cap="flat" cmpd="sng" algn="ctr">
-                      <a:solidFill>
-                        <a:srgbClr val="000000"/>
-                      </a:solidFill>
-                      <a:prstDash val="solid"/>
-                      <a:round/>
-                      <a:headEnd type="none" w="med" len="med"/>
-                      <a:tailEnd type="none" w="med" len="med"/>
-                    </a:lnL>
-                    <a:lnR w="7620" cap="flat" cmpd="sng" algn="ctr">
-                      <a:solidFill>
-                        <a:srgbClr val="666666"/>
-                      </a:solidFill>
-                      <a:prstDash val="solid"/>
-                      <a:round/>
-                      <a:headEnd type="none" w="med" len="med"/>
-                      <a:tailEnd type="none" w="med" len="med"/>
-                    </a:lnR>
-                    <a:lnT w="7620" cap="flat" cmpd="sng" algn="ctr">
-                      <a:solidFill>
-                        <a:srgbClr val="000000"/>
-                      </a:solidFill>
-                      <a:prstDash val="solid"/>
-                      <a:round/>
-                      <a:headEnd type="none" w="med" len="med"/>
-                      <a:tailEnd type="none" w="med" len="med"/>
-                    </a:lnT>
-                    <a:lnB w="7620" cap="flat" cmpd="sng" algn="ctr">
-                      <a:solidFill>
-                        <a:srgbClr val="000000"/>
-                      </a:solidFill>
-                      <a:prstDash val="solid"/>
-                      <a:round/>
-                      <a:headEnd type="none" w="med" len="med"/>
-                      <a:tailEnd type="none" w="med" len="med"/>
-                    </a:lnB>
-                    <a:solidFill>
-                      <a:srgbClr val="EBF3FF"/>
-                    </a:solidFill>
-                  </a:tcPr>
-                </a:tc>
-              </a:tr>
-              <a:tr h="198120">
-                <a:tc>
-                  <a:txBody>
-                    <a:bodyPr/>
-                    <a:lstStyle/>
-                    <a:p>
-                      <a:r>
-                        <a:rPr lang="en-US" dirty="0">
-                          <a:effectLst/>
-                        </a:rPr>
-                        <a:t>MTOM is based on open specifications &amp; hence is </a:t>
-                      </a:r>
-                      <a:r>
-                        <a:rPr lang="en-US" b="1" dirty="0">
-                          <a:effectLst/>
-                        </a:rPr>
-                        <a:t>largely interoperable.</a:t>
-                      </a:r>
-                    </a:p>
-                  </a:txBody>
-                  <a:tcPr marL="76200" marR="76200" marT="38100" marB="38100" anchor="ctr">
-                    <a:lnL w="7620" cap="flat" cmpd="sng" algn="ctr">
-                      <a:solidFill>
-                        <a:srgbClr val="000000"/>
-                      </a:solidFill>
-                      <a:prstDash val="solid"/>
-                      <a:round/>
-                      <a:headEnd type="none" w="med" len="med"/>
-                      <a:tailEnd type="none" w="med" len="med"/>
-                    </a:lnL>
-                    <a:lnR w="7620" cap="flat" cmpd="sng" algn="ctr">
-                      <a:solidFill>
-                        <a:srgbClr val="666666"/>
-                      </a:solidFill>
-                      <a:prstDash val="solid"/>
-                      <a:round/>
-                      <a:headEnd type="none" w="med" len="med"/>
-                      <a:tailEnd type="none" w="med" len="med"/>
-                    </a:lnR>
-                    <a:lnT w="7620" cap="flat" cmpd="sng" algn="ctr">
-                      <a:solidFill>
-                        <a:srgbClr val="000000"/>
-                      </a:solidFill>
-                      <a:prstDash val="solid"/>
-                      <a:round/>
-                      <a:headEnd type="none" w="med" len="med"/>
-                      <a:tailEnd type="none" w="med" len="med"/>
-                    </a:lnT>
-                    <a:lnB w="7620" cap="flat" cmpd="sng" algn="ctr">
-                      <a:solidFill>
-                        <a:srgbClr val="666666"/>
-                      </a:solidFill>
-                      <a:prstDash val="solid"/>
-                      <a:round/>
-                      <a:headEnd type="none" w="med" len="med"/>
-                      <a:tailEnd type="none" w="med" len="med"/>
-                    </a:lnB>
-                    <a:solidFill>
-                      <a:srgbClr val="FFFFFF"/>
-                    </a:solidFill>
-                  </a:tcPr>
-                </a:tc>
-              </a:tr>
-            </a:tbl>
-          </a:graphicData>
-        </a:graphic>
-      </p:graphicFrame>
-    </p:spTree>
-    <p:extLst>
-      <p:ext uri="{BB962C8B-B14F-4D97-AF65-F5344CB8AC3E}">
-        <p14:creationId xmlns:p14="http://schemas.microsoft.com/office/powerpoint/2010/main" val="2617310481"/>
-      </p:ext>
-    </p:extLst>
-  </p:cSld>
-  <p:clrMapOvr>
-    <a:masterClrMapping/>
-  </p:clrMapOvr>
-  <p:timing>
-    <p:tnLst>
-      <p:par>
-        <p:cTn id="1" dur="indefinite" restart="never" nodeType="tmRoot"/>
-      </p:par>
-    </p:tnLst>
-  </p:timing>
-</p:sld>
-</file>
-
-<file path=ppt/slides/slide41.xml><?xml version="1.0" encoding="utf-8"?>
-<p:sld xmlns:a="http://schemas.openxmlformats.org/drawingml/2006/main" xmlns:r="http://schemas.openxmlformats.org/officeDocument/2006/relationships" xmlns:p="http://schemas.openxmlformats.org/presentationml/2006/main">
-  <p:cSld>
-    <p:spTree>
-      <p:nvGrpSpPr>
-        <p:cNvPr id="1" name=""/>
-        <p:cNvGrpSpPr/>
-        <p:nvPr/>
-      </p:nvGrpSpPr>
-      <p:grpSpPr>
-        <a:xfrm>
-          <a:off x="0" y="0"/>
-          <a:ext cx="0" cy="0"/>
-          <a:chOff x="0" y="0"/>
-          <a:chExt cx="0" cy="0"/>
-        </a:xfrm>
-      </p:grpSpPr>
-      <p:sp>
-        <p:nvSpPr>
-          <p:cNvPr id="2" name="Rectangle 1"/>
-          <p:cNvSpPr/>
-          <p:nvPr/>
-        </p:nvSpPr>
-        <p:spPr>
-          <a:xfrm>
             <a:off x="490631" y="265413"/>
             <a:ext cx="4128261" cy="1384995"/>
           </a:xfrm>
@@ -40734,7 +40661,7 @@
 </p:sld>
 </file>
 
-<file path=ppt/slides/slide42.xml><?xml version="1.0" encoding="utf-8"?>
+<file path=ppt/slides/slide41.xml><?xml version="1.0" encoding="utf-8"?>
 <p:sld xmlns:a="http://schemas.openxmlformats.org/drawingml/2006/main" xmlns:r="http://schemas.openxmlformats.org/officeDocument/2006/relationships" xmlns:p="http://schemas.openxmlformats.org/presentationml/2006/main">
   <p:cSld>
     <p:spTree>
@@ -42066,7 +41993,7 @@
 </p:sld>
 </file>
 
-<file path=ppt/slides/slide43.xml><?xml version="1.0" encoding="utf-8"?>
+<file path=ppt/slides/slide42.xml><?xml version="1.0" encoding="utf-8"?>
 <p:sld xmlns:a="http://schemas.openxmlformats.org/drawingml/2006/main" xmlns:r="http://schemas.openxmlformats.org/officeDocument/2006/relationships" xmlns:p="http://schemas.openxmlformats.org/presentationml/2006/main">
   <p:cSld>
     <p:spTree>
@@ -42149,7 +42076,7 @@
 </p:sld>
 </file>
 
-<file path=ppt/slides/slide44.xml><?xml version="1.0" encoding="utf-8"?>
+<file path=ppt/slides/slide43.xml><?xml version="1.0" encoding="utf-8"?>
 <p:sld xmlns:a="http://schemas.openxmlformats.org/drawingml/2006/main" xmlns:r="http://schemas.openxmlformats.org/officeDocument/2006/relationships" xmlns:p="http://schemas.openxmlformats.org/presentationml/2006/main">
   <p:cSld>
     <p:spTree>
@@ -42702,7 +42629,7 @@
 </p:sld>
 </file>
 
-<file path=ppt/slides/slide45.xml><?xml version="1.0" encoding="utf-8"?>
+<file path=ppt/slides/slide44.xml><?xml version="1.0" encoding="utf-8"?>
 <p:sld xmlns:a="http://schemas.openxmlformats.org/drawingml/2006/main" xmlns:r="http://schemas.openxmlformats.org/officeDocument/2006/relationships" xmlns:p="http://schemas.openxmlformats.org/presentationml/2006/main">
   <p:cSld>
     <p:spTree>
@@ -42736,11 +42663,7 @@
           <a:p>
             <a:r>
               <a:rPr lang="en-US" dirty="0" smtClean="0"/>
-              <a:t>Consuming a WCF </a:t>
-            </a:r>
-            <a:r>
-              <a:rPr lang="en-US" dirty="0" smtClean="0"/>
-              <a:t>Service Library</a:t>
+              <a:t>Consuming a WCF Service Library</a:t>
             </a:r>
             <a:endParaRPr lang="en-US" b="1" dirty="0"/>
           </a:p>
@@ -42766,7 +42689,7 @@
 </p:sld>
 </file>
 
-<file path=ppt/slides/slide46.xml><?xml version="1.0" encoding="utf-8"?>
+<file path=ppt/slides/slide45.xml><?xml version="1.0" encoding="utf-8"?>
 <p:sld xmlns:a="http://schemas.openxmlformats.org/drawingml/2006/main" xmlns:r="http://schemas.openxmlformats.org/officeDocument/2006/relationships" xmlns:p="http://schemas.openxmlformats.org/presentationml/2006/main">
   <p:cSld>
     <p:spTree>
@@ -42849,7 +42772,7 @@
 </p:sld>
 </file>
 
-<file path=ppt/slides/slide47.xml><?xml version="1.0" encoding="utf-8"?>
+<file path=ppt/slides/slide46.xml><?xml version="1.0" encoding="utf-8"?>
 <p:sld xmlns:a="http://schemas.openxmlformats.org/drawingml/2006/main" xmlns:r="http://schemas.openxmlformats.org/officeDocument/2006/relationships" xmlns:p="http://schemas.openxmlformats.org/presentationml/2006/main">
   <p:cSld>
     <p:spTree>
@@ -43727,7 +43650,7 @@
 </p:sld>
 </file>
 
-<file path=ppt/slides/slide48.xml><?xml version="1.0" encoding="utf-8"?>
+<file path=ppt/slides/slide47.xml><?xml version="1.0" encoding="utf-8"?>
 <p:sld xmlns:a="http://schemas.openxmlformats.org/drawingml/2006/main" xmlns:r="http://schemas.openxmlformats.org/officeDocument/2006/relationships" xmlns:p="http://schemas.openxmlformats.org/presentationml/2006/main">
   <p:cSld>
     <p:spTree>
@@ -44479,7 +44402,7 @@
 </p:sld>
 </file>
 
-<file path=ppt/slides/slide49.xml><?xml version="1.0" encoding="utf-8"?>
+<file path=ppt/slides/slide48.xml><?xml version="1.0" encoding="utf-8"?>
 <p:sld xmlns:a="http://schemas.openxmlformats.org/drawingml/2006/main" xmlns:r="http://schemas.openxmlformats.org/officeDocument/2006/relationships" xmlns:p="http://schemas.openxmlformats.org/presentationml/2006/main">
   <p:cSld>
     <p:spTree>
@@ -45132,133 +45055,7 @@
 </p:sld>
 </file>
 
-<file path=ppt/slides/slide5.xml><?xml version="1.0" encoding="utf-8"?>
-<p:sld xmlns:a="http://schemas.openxmlformats.org/drawingml/2006/main" xmlns:r="http://schemas.openxmlformats.org/officeDocument/2006/relationships" xmlns:p="http://schemas.openxmlformats.org/presentationml/2006/main">
-  <p:cSld>
-    <p:spTree>
-      <p:nvGrpSpPr>
-        <p:cNvPr id="1" name=""/>
-        <p:cNvGrpSpPr/>
-        <p:nvPr/>
-      </p:nvGrpSpPr>
-      <p:grpSpPr>
-        <a:xfrm>
-          <a:off x="0" y="0"/>
-          <a:ext cx="0" cy="0"/>
-          <a:chOff x="0" y="0"/>
-          <a:chExt cx="0" cy="0"/>
-        </a:xfrm>
-      </p:grpSpPr>
-      <p:sp>
-        <p:nvSpPr>
-          <p:cNvPr id="2" name="Title 1"/>
-          <p:cNvSpPr>
-            <a:spLocks noGrp="1"/>
-          </p:cNvSpPr>
-          <p:nvPr>
-            <p:ph type="title"/>
-          </p:nvPr>
-        </p:nvSpPr>
-        <p:spPr/>
-        <p:txBody>
-          <a:bodyPr/>
-          <a:lstStyle/>
-          <a:p>
-            <a:pPr lvl="0"/>
-            <a:r>
-              <a:rPr lang="en-US" smtClean="0"/>
-              <a:t>Setting Expectations</a:t>
-            </a:r>
-            <a:endParaRPr lang="en-US" dirty="0"/>
-          </a:p>
-        </p:txBody>
-      </p:sp>
-      <p:sp>
-        <p:nvSpPr>
-          <p:cNvPr id="3" name="Content Placeholder 2"/>
-          <p:cNvSpPr>
-            <a:spLocks noGrp="1"/>
-          </p:cNvSpPr>
-          <p:nvPr>
-            <p:ph sz="quarter" idx="10"/>
-          </p:nvPr>
-        </p:nvSpPr>
-        <p:spPr/>
-        <p:txBody>
-          <a:bodyPr/>
-          <a:lstStyle/>
-          <a:p>
-            <a:r>
-              <a:rPr lang="en-US" dirty="0" smtClean="0"/>
-              <a:t>Target Audience</a:t>
-            </a:r>
-          </a:p>
-          <a:p>
-            <a:pPr lvl="1"/>
-            <a:r>
-              <a:rPr lang="en-US" dirty="0" smtClean="0"/>
-              <a:t>Developing </a:t>
-            </a:r>
-            <a:r>
-              <a:rPr lang="en-US" dirty="0"/>
-              <a:t>solutions for SharePoint products and technologies in a team-based, medium-sized to large development </a:t>
-            </a:r>
-            <a:r>
-              <a:rPr lang="en-US" dirty="0" smtClean="0"/>
-              <a:t>environment</a:t>
-            </a:r>
-          </a:p>
-          <a:p>
-            <a:pPr lvl="1"/>
-            <a:r>
-              <a:rPr lang="en-US" dirty="0" smtClean="0"/>
-              <a:t>Considering taking the 70-488 Exam</a:t>
-            </a:r>
-          </a:p>
-          <a:p>
-            <a:r>
-              <a:rPr lang="en-US" dirty="0" smtClean="0"/>
-              <a:t>Additional Material</a:t>
-            </a:r>
-          </a:p>
-          <a:p>
-            <a:pPr lvl="1"/>
-            <a:r>
-              <a:rPr lang="en-US" dirty="0" smtClean="0"/>
-              <a:t>Microsoft Official Course 20488</a:t>
-            </a:r>
-          </a:p>
-          <a:p>
-            <a:pPr lvl="2"/>
-            <a:r>
-              <a:rPr lang="en-US" dirty="0"/>
-              <a:t>Developing Microsoft SharePoint®  Core Solutions </a:t>
-            </a:r>
-            <a:endParaRPr lang="en-US" dirty="0" smtClean="0"/>
-          </a:p>
-        </p:txBody>
-      </p:sp>
-    </p:spTree>
-    <p:extLst>
-      <p:ext uri="{BB962C8B-B14F-4D97-AF65-F5344CB8AC3E}">
-        <p14:creationId xmlns:p14="http://schemas.microsoft.com/office/powerpoint/2010/main" val="3396969273"/>
-      </p:ext>
-    </p:extLst>
-  </p:cSld>
-  <p:clrMapOvr>
-    <a:masterClrMapping/>
-  </p:clrMapOvr>
-  <p:timing>
-    <p:tnLst>
-      <p:par>
-        <p:cTn id="1" dur="indefinite" restart="never" nodeType="tmRoot"/>
-      </p:par>
-    </p:tnLst>
-  </p:timing>
-</p:sld>
-</file>
-
-<file path=ppt/slides/slide50.xml><?xml version="1.0" encoding="utf-8"?>
+<file path=ppt/slides/slide49.xml><?xml version="1.0" encoding="utf-8"?>
 <p:sld xmlns:a="http://schemas.openxmlformats.org/drawingml/2006/main" xmlns:r="http://schemas.openxmlformats.org/officeDocument/2006/relationships" xmlns:p="http://schemas.openxmlformats.org/presentationml/2006/main">
   <p:cSld>
     <p:spTree>
@@ -45893,7 +45690,153 @@
 </p:sld>
 </file>
 
-<file path=ppt/slides/slide51.xml><?xml version="1.0" encoding="utf-8"?>
+<file path=ppt/slides/slide5.xml><?xml version="1.0" encoding="utf-8"?>
+<p:sld xmlns:a="http://schemas.openxmlformats.org/drawingml/2006/main" xmlns:r="http://schemas.openxmlformats.org/officeDocument/2006/relationships" xmlns:p="http://schemas.openxmlformats.org/presentationml/2006/main">
+  <p:cSld>
+    <p:spTree>
+      <p:nvGrpSpPr>
+        <p:cNvPr id="1" name=""/>
+        <p:cNvGrpSpPr/>
+        <p:nvPr/>
+      </p:nvGrpSpPr>
+      <p:grpSpPr>
+        <a:xfrm>
+          <a:off x="0" y="0"/>
+          <a:ext cx="0" cy="0"/>
+          <a:chOff x="0" y="0"/>
+          <a:chExt cx="0" cy="0"/>
+        </a:xfrm>
+      </p:grpSpPr>
+      <p:sp>
+        <p:nvSpPr>
+          <p:cNvPr id="2" name="Title 1"/>
+          <p:cNvSpPr>
+            <a:spLocks noGrp="1"/>
+          </p:cNvSpPr>
+          <p:nvPr>
+            <p:ph type="title"/>
+          </p:nvPr>
+        </p:nvSpPr>
+        <p:spPr/>
+        <p:txBody>
+          <a:bodyPr/>
+          <a:lstStyle/>
+          <a:p>
+            <a:pPr lvl="0"/>
+            <a:r>
+              <a:rPr lang="en-US" smtClean="0"/>
+              <a:t>Setting Expectations</a:t>
+            </a:r>
+            <a:endParaRPr lang="en-US" dirty="0"/>
+          </a:p>
+        </p:txBody>
+      </p:sp>
+      <p:sp>
+        <p:nvSpPr>
+          <p:cNvPr id="3" name="Content Placeholder 2"/>
+          <p:cNvSpPr>
+            <a:spLocks noGrp="1"/>
+          </p:cNvSpPr>
+          <p:nvPr>
+            <p:ph sz="quarter" idx="10"/>
+          </p:nvPr>
+        </p:nvSpPr>
+        <p:spPr/>
+        <p:txBody>
+          <a:bodyPr/>
+          <a:lstStyle/>
+          <a:p>
+            <a:r>
+              <a:rPr lang="en-US" dirty="0" smtClean="0"/>
+              <a:t>Target Audience</a:t>
+            </a:r>
+          </a:p>
+          <a:p>
+            <a:pPr lvl="1"/>
+            <a:r>
+              <a:rPr lang="en-US" dirty="0" smtClean="0"/>
+              <a:t>Developers looking to host WCF or Web API services in Windows Azure, with data stored in Azure Storage or Azure SQL Database</a:t>
+            </a:r>
+            <a:endParaRPr lang="en-US" dirty="0" smtClean="0"/>
+          </a:p>
+          <a:p>
+            <a:pPr lvl="1"/>
+            <a:r>
+              <a:rPr lang="en-US" dirty="0" smtClean="0"/>
+              <a:t>Considering taking the </a:t>
+            </a:r>
+            <a:r>
+              <a:rPr lang="en-US" dirty="0" smtClean="0"/>
+              <a:t>70-487 </a:t>
+            </a:r>
+            <a:r>
+              <a:rPr lang="en-US" dirty="0" smtClean="0"/>
+              <a:t>Exam</a:t>
+            </a:r>
+          </a:p>
+          <a:p>
+            <a:r>
+              <a:rPr lang="en-US" dirty="0" smtClean="0"/>
+              <a:t>Additional Material</a:t>
+            </a:r>
+          </a:p>
+          <a:p>
+            <a:pPr lvl="1"/>
+            <a:r>
+              <a:rPr lang="en-US" dirty="0" smtClean="0"/>
+              <a:t>Microsoft Official Course </a:t>
+            </a:r>
+            <a:r>
+              <a:rPr lang="en-US" dirty="0" smtClean="0"/>
+              <a:t>20487</a:t>
+            </a:r>
+            <a:endParaRPr lang="en-US" dirty="0" smtClean="0"/>
+          </a:p>
+          <a:p>
+            <a:pPr lvl="2"/>
+            <a:r>
+              <a:rPr lang="en-US" dirty="0">
+                <a:solidFill>
+                  <a:schemeClr val="tx1">
+                    <a:lumMod val="75000"/>
+                    <a:lumOff val="25000"/>
+                  </a:schemeClr>
+                </a:solidFill>
+              </a:rPr>
+              <a:t>Developing Windows Azure and Web Services</a:t>
+            </a:r>
+            <a:endParaRPr lang="en-US" dirty="0" smtClean="0">
+              <a:solidFill>
+                <a:schemeClr val="tx1">
+                  <a:lumMod val="75000"/>
+                  <a:lumOff val="25000"/>
+                </a:schemeClr>
+              </a:solidFill>
+            </a:endParaRPr>
+          </a:p>
+        </p:txBody>
+      </p:sp>
+    </p:spTree>
+    <p:extLst>
+      <p:ext uri="{BB962C8B-B14F-4D97-AF65-F5344CB8AC3E}">
+        <p14:creationId xmlns:p14="http://schemas.microsoft.com/office/powerpoint/2010/main" val="3396969273"/>
+      </p:ext>
+    </p:extLst>
+  </p:cSld>
+  <p:clrMapOvr>
+    <a:masterClrMapping/>
+  </p:clrMapOvr>
+  <p:timing>
+    <p:tnLst>
+      <p:par>
+        <p:cTn id="1" dur="indefinite" restart="never" nodeType="tmRoot"/>
+      </p:par>
+    </p:tnLst>
+  </p:timing>
+</p:sld>
+</file>
+
+<file path=ppt/slides/slide50.xml><?xml version="1.0" encoding="utf-8"?>
 <p:sld xmlns:a="http://schemas.openxmlformats.org/drawingml/2006/main" xmlns:r="http://schemas.openxmlformats.org/officeDocument/2006/relationships" xmlns:p="http://schemas.openxmlformats.org/presentationml/2006/main">
   <p:cSld>
     <p:spTree>
@@ -45927,19 +45870,11 @@
           <a:p>
             <a:r>
               <a:rPr lang="en-US" smtClean="0"/>
-              <a:t>Hosting</a:t>
-            </a:r>
-            <a:r>
-              <a:rPr lang="en-US" smtClean="0"/>
-              <a:t> </a:t>
+              <a:t>Hosting </a:t>
             </a:r>
             <a:r>
               <a:rPr lang="en-US" dirty="0" smtClean="0"/>
-              <a:t>a WCF </a:t>
-            </a:r>
-            <a:r>
-              <a:rPr lang="en-US" dirty="0" smtClean="0"/>
-              <a:t>Service Library</a:t>
+              <a:t>a WCF Service Library</a:t>
             </a:r>
             <a:endParaRPr lang="en-US" b="1" dirty="0"/>
           </a:p>
@@ -45965,7 +45900,7 @@
 </p:sld>
 </file>
 
-<file path=ppt/slides/slide52.xml><?xml version="1.0" encoding="utf-8"?>
+<file path=ppt/slides/slide51.xml><?xml version="1.0" encoding="utf-8"?>
 <p:sld xmlns:a="http://schemas.openxmlformats.org/drawingml/2006/main" xmlns:r="http://schemas.openxmlformats.org/officeDocument/2006/relationships" xmlns:p="http://schemas.openxmlformats.org/presentationml/2006/main">
   <p:cSld>
     <p:spTree>
@@ -46101,16 +46036,24 @@
               <a:t>Enter this code: </a:t>
             </a:r>
             <a:r>
-              <a:rPr lang="en-US" b="1" dirty="0" err="1" smtClean="0"/>
-              <a:t>DevSPS</a:t>
+              <a:rPr lang="en-US" b="1" dirty="0" err="1"/>
+              <a:t>AzWebSvc</a:t>
             </a:r>
             <a:r>
-              <a:rPr lang="en-US" b="1" dirty="0" smtClean="0"/>
-              <a:t> </a:t>
+              <a:rPr lang="en-US" b="1" dirty="0"/>
+              <a:t>  </a:t>
             </a:r>
             <a:r>
               <a:rPr lang="en-US" dirty="0" smtClean="0"/>
-              <a:t>(expires 11/25/2013)</a:t>
+              <a:t>(expires </a:t>
+            </a:r>
+            <a:r>
+              <a:rPr lang="en-US" dirty="0" smtClean="0"/>
+              <a:t>12/13/2013</a:t>
+            </a:r>
+            <a:r>
+              <a:rPr lang="en-US" dirty="0" smtClean="0"/>
+              <a:t>)</a:t>
             </a:r>
             <a:endParaRPr lang="en-US" dirty="0"/>
           </a:p>
@@ -46312,98 +46255,6 @@
       </p:grpSpPr>
       <p:sp>
         <p:nvSpPr>
-          <p:cNvPr id="7" name="Content Placeholder 6"/>
-          <p:cNvSpPr>
-            <a:spLocks noGrp="1"/>
-          </p:cNvSpPr>
-          <p:nvPr>
-            <p:ph sz="quarter" idx="10"/>
-          </p:nvPr>
-        </p:nvSpPr>
-        <p:spPr/>
-        <p:txBody>
-          <a:bodyPr>
-            <a:normAutofit/>
-          </a:bodyPr>
-          <a:lstStyle/>
-          <a:p>
-            <a:r>
-              <a:rPr lang="en-US" dirty="0" smtClean="0"/>
-              <a:t>WCF Overview</a:t>
-            </a:r>
-            <a:endParaRPr lang="en-US" dirty="0"/>
-          </a:p>
-          <a:p>
-            <a:r>
-              <a:rPr lang="en-US" dirty="0" smtClean="0"/>
-              <a:t>SOAP vs. REST</a:t>
-            </a:r>
-            <a:endParaRPr lang="en-US" dirty="0"/>
-          </a:p>
-        </p:txBody>
-      </p:sp>
-      <p:sp>
-        <p:nvSpPr>
-          <p:cNvPr id="2" name="Title 1"/>
-          <p:cNvSpPr>
-            <a:spLocks noGrp="1"/>
-          </p:cNvSpPr>
-          <p:nvPr>
-            <p:ph type="title"/>
-          </p:nvPr>
-        </p:nvSpPr>
-        <p:spPr/>
-        <p:txBody>
-          <a:bodyPr/>
-          <a:lstStyle/>
-          <a:p>
-            <a:r>
-              <a:rPr lang="en-US" smtClean="0"/>
-              <a:t>Module Overview</a:t>
-            </a:r>
-            <a:endParaRPr lang="en-US" dirty="0"/>
-          </a:p>
-        </p:txBody>
-      </p:sp>
-    </p:spTree>
-    <p:extLst>
-      <p:ext uri="{BB962C8B-B14F-4D97-AF65-F5344CB8AC3E}">
-        <p14:creationId xmlns:p14="http://schemas.microsoft.com/office/powerpoint/2010/main" val="318349970"/>
-      </p:ext>
-    </p:extLst>
-  </p:cSld>
-  <p:clrMapOvr>
-    <a:masterClrMapping/>
-  </p:clrMapOvr>
-  <p:timing>
-    <p:tnLst>
-      <p:par>
-        <p:cTn id="1" dur="indefinite" restart="never" nodeType="tmRoot"/>
-      </p:par>
-    </p:tnLst>
-  </p:timing>
-</p:sld>
-</file>
-
-<file path=ppt/slides/slide9.xml><?xml version="1.0" encoding="utf-8"?>
-<p:sld xmlns:a="http://schemas.openxmlformats.org/drawingml/2006/main" xmlns:r="http://schemas.openxmlformats.org/officeDocument/2006/relationships" xmlns:p="http://schemas.openxmlformats.org/presentationml/2006/main">
-  <p:cSld>
-    <p:spTree>
-      <p:nvGrpSpPr>
-        <p:cNvPr id="1" name=""/>
-        <p:cNvGrpSpPr/>
-        <p:nvPr/>
-      </p:nvGrpSpPr>
-      <p:grpSpPr>
-        <a:xfrm>
-          <a:off x="0" y="0"/>
-          <a:ext cx="0" cy="0"/>
-          <a:chOff x="0" y="0"/>
-          <a:chExt cx="0" cy="0"/>
-        </a:xfrm>
-      </p:grpSpPr>
-      <p:sp>
-        <p:nvSpPr>
           <p:cNvPr id="5" name="Text Placeholder 4"/>
           <p:cNvSpPr>
             <a:spLocks noGrp="1"/>
@@ -46448,6 +46299,113 @@
     <p:extLst>
       <p:ext uri="{BB962C8B-B14F-4D97-AF65-F5344CB8AC3E}">
         <p14:creationId xmlns:p14="http://schemas.microsoft.com/office/powerpoint/2010/main" val="1422955238"/>
+      </p:ext>
+    </p:extLst>
+  </p:cSld>
+  <p:clrMapOvr>
+    <a:masterClrMapping/>
+  </p:clrMapOvr>
+  <p:timing>
+    <p:tnLst>
+      <p:par>
+        <p:cTn id="1" dur="indefinite" restart="never" nodeType="tmRoot"/>
+      </p:par>
+    </p:tnLst>
+  </p:timing>
+</p:sld>
+</file>
+
+<file path=ppt/slides/slide9.xml><?xml version="1.0" encoding="utf-8"?>
+<p:sld xmlns:a="http://schemas.openxmlformats.org/drawingml/2006/main" xmlns:r="http://schemas.openxmlformats.org/officeDocument/2006/relationships" xmlns:p="http://schemas.openxmlformats.org/presentationml/2006/main">
+  <p:cSld>
+    <p:spTree>
+      <p:nvGrpSpPr>
+        <p:cNvPr id="1" name=""/>
+        <p:cNvGrpSpPr/>
+        <p:nvPr/>
+      </p:nvGrpSpPr>
+      <p:grpSpPr>
+        <a:xfrm>
+          <a:off x="0" y="0"/>
+          <a:ext cx="0" cy="0"/>
+          <a:chOff x="0" y="0"/>
+          <a:chExt cx="0" cy="0"/>
+        </a:xfrm>
+      </p:grpSpPr>
+      <p:sp>
+        <p:nvSpPr>
+          <p:cNvPr id="7" name="Content Placeholder 6"/>
+          <p:cNvSpPr>
+            <a:spLocks noGrp="1"/>
+          </p:cNvSpPr>
+          <p:nvPr>
+            <p:ph sz="quarter" idx="10"/>
+          </p:nvPr>
+        </p:nvSpPr>
+        <p:spPr/>
+        <p:txBody>
+          <a:bodyPr>
+            <a:normAutofit/>
+          </a:bodyPr>
+          <a:lstStyle/>
+          <a:p>
+            <a:r>
+              <a:rPr lang="en-US" dirty="0" smtClean="0"/>
+              <a:t>WCF Overview</a:t>
+            </a:r>
+          </a:p>
+          <a:p>
+            <a:r>
+              <a:rPr lang="en-US" dirty="0" smtClean="0"/>
+              <a:t>Configuring Servi</a:t>
+            </a:r>
+            <a:r>
+              <a:rPr lang="en-US" dirty="0" smtClean="0"/>
+              <a:t>ces</a:t>
+            </a:r>
+          </a:p>
+          <a:p>
+            <a:r>
+              <a:rPr lang="en-US" dirty="0" smtClean="0"/>
+              <a:t>Consuming Services</a:t>
+            </a:r>
+          </a:p>
+          <a:p>
+            <a:r>
+              <a:rPr lang="en-US" dirty="0" smtClean="0"/>
+              <a:t>Hosting WCF Services</a:t>
+            </a:r>
+            <a:endParaRPr lang="en-US" dirty="0"/>
+          </a:p>
+        </p:txBody>
+      </p:sp>
+      <p:sp>
+        <p:nvSpPr>
+          <p:cNvPr id="2" name="Title 1"/>
+          <p:cNvSpPr>
+            <a:spLocks noGrp="1"/>
+          </p:cNvSpPr>
+          <p:nvPr>
+            <p:ph type="title"/>
+          </p:nvPr>
+        </p:nvSpPr>
+        <p:spPr/>
+        <p:txBody>
+          <a:bodyPr/>
+          <a:lstStyle/>
+          <a:p>
+            <a:r>
+              <a:rPr lang="en-US" smtClean="0"/>
+              <a:t>Module Overview</a:t>
+            </a:r>
+            <a:endParaRPr lang="en-US" dirty="0"/>
+          </a:p>
+        </p:txBody>
+      </p:sp>
+    </p:spTree>
+    <p:extLst>
+      <p:ext uri="{BB962C8B-B14F-4D97-AF65-F5344CB8AC3E}">
+        <p14:creationId xmlns:p14="http://schemas.microsoft.com/office/powerpoint/2010/main" val="318349970"/>
       </p:ext>
     </p:extLst>
   </p:cSld>
@@ -47249,6 +47207,33 @@
 </file>
 
 <file path=customXml/item1.xml><?xml version="1.0" encoding="utf-8"?>
+<p:properties xmlns:p="http://schemas.microsoft.com/office/2006/metadata/properties" xmlns:xsi="http://www.w3.org/2001/XMLSchema-instance" xmlns:pc="http://schemas.microsoft.com/office/infopath/2007/PartnerControls">
+  <documentManagement>
+    <TaxCatchAll xmlns="230e9df3-be65-4c73-a93b-d1236ebd677e">
+      <Value>24</Value>
+    </TaxCatchAll>
+    <gb399f5cafb3492e9758fe6e7129f04d xmlns="9144449b-ba5a-4612-98a9-381e907e54b6">
+      <Terms xmlns="http://schemas.microsoft.com/office/infopath/2007/PartnerControls">
+        <TermInfo xmlns="http://schemas.microsoft.com/office/infopath/2007/PartnerControls">
+          <TermName xmlns="http://schemas.microsoft.com/office/infopath/2007/PartnerControls">Content Templates</TermName>
+          <TermId xmlns="http://schemas.microsoft.com/office/infopath/2007/PartnerControls">bdbbc9aa-4892-4816-9e36-bf1120da60e9</TermId>
+        </TermInfo>
+      </Terms>
+    </gb399f5cafb3492e9758fe6e7129f04d>
+  </documentManagement>
+</p:properties>
+</file>
+
+<file path=customXml/item2.xml><?xml version="1.0" encoding="utf-8"?>
+<?mso-contentType ?>
+<FormTemplates xmlns="http://schemas.microsoft.com/sharepoint/v3/contenttype/forms">
+  <Display>DocumentLibraryForm</Display>
+  <Edit>DocumentLibraryForm</Edit>
+  <New>DocumentLibraryForm</New>
+</FormTemplates>
+</file>
+
+<file path=customXml/item3.xml><?xml version="1.0" encoding="utf-8"?>
 <ct:contentTypeSchema xmlns:ct="http://schemas.microsoft.com/office/2006/metadata/contentType" xmlns:ma="http://schemas.microsoft.com/office/2006/metadata/properties/metaAttributes" ct:_="" ma:_="" ma:contentTypeName="Document" ma:contentTypeID="0x010100B77C1942F61CC445966EF0B72456FB71" ma:contentTypeVersion="5" ma:contentTypeDescription="Create a new document." ma:contentTypeScope="" ma:versionID="5421a2b3915c7c9b88cb078d9907b3f4">
   <xsd:schema xmlns:xsd="http://www.w3.org/2001/XMLSchema" xmlns:xs="http://www.w3.org/2001/XMLSchema" xmlns:p="http://schemas.microsoft.com/office/2006/metadata/properties" xmlns:ns2="230e9df3-be65-4c73-a93b-d1236ebd677e" xmlns:ns3="9144449b-ba5a-4612-98a9-381e907e54b6" targetNamespace="http://schemas.microsoft.com/office/2006/metadata/properties" ma:root="true" ma:fieldsID="c375f00a2d990dcf3e2772267a56beac" ns2:_="" ns3:_="">
     <xsd:import namespace="230e9df3-be65-4c73-a93b-d1236ebd677e"/>
@@ -47393,34 +47378,32 @@
 </ct:contentTypeSchema>
 </file>
 
-<file path=customXml/item2.xml><?xml version="1.0" encoding="utf-8"?>
-<p:properties xmlns:p="http://schemas.microsoft.com/office/2006/metadata/properties" xmlns:xsi="http://www.w3.org/2001/XMLSchema-instance" xmlns:pc="http://schemas.microsoft.com/office/infopath/2007/PartnerControls">
-  <documentManagement>
-    <TaxCatchAll xmlns="230e9df3-be65-4c73-a93b-d1236ebd677e">
-      <Value>24</Value>
-    </TaxCatchAll>
-    <gb399f5cafb3492e9758fe6e7129f04d xmlns="9144449b-ba5a-4612-98a9-381e907e54b6">
-      <Terms xmlns="http://schemas.microsoft.com/office/infopath/2007/PartnerControls">
-        <TermInfo xmlns="http://schemas.microsoft.com/office/infopath/2007/PartnerControls">
-          <TermName xmlns="http://schemas.microsoft.com/office/infopath/2007/PartnerControls">Content Templates</TermName>
-          <TermId xmlns="http://schemas.microsoft.com/office/infopath/2007/PartnerControls">bdbbc9aa-4892-4816-9e36-bf1120da60e9</TermId>
-        </TermInfo>
-      </Terms>
-    </gb399f5cafb3492e9758fe6e7129f04d>
-  </documentManagement>
-</p:properties>
+<file path=customXml/itemProps1.xml><?xml version="1.0" encoding="utf-8"?>
+<ds:datastoreItem xmlns:ds="http://schemas.openxmlformats.org/officeDocument/2006/customXml" ds:itemID="{7025FDD9-4C58-4084-9F89-0E6ADD6FFF55}">
+  <ds:schemaRefs>
+    <ds:schemaRef ds:uri="http://schemas.openxmlformats.org/package/2006/metadata/core-properties"/>
+    <ds:schemaRef ds:uri="http://schemas.microsoft.com/office/2006/documentManagement/types"/>
+    <ds:schemaRef ds:uri="http://schemas.microsoft.com/office/2006/metadata/properties"/>
+    <ds:schemaRef ds:uri="230e9df3-be65-4c73-a93b-d1236ebd677e"/>
+    <ds:schemaRef ds:uri="9144449b-ba5a-4612-98a9-381e907e54b6"/>
+    <ds:schemaRef ds:uri="http://schemas.microsoft.com/office/infopath/2007/PartnerControls"/>
+    <ds:schemaRef ds:uri="http://purl.org/dc/elements/1.1/"/>
+    <ds:schemaRef ds:uri="http://www.w3.org/XML/1998/namespace"/>
+    <ds:schemaRef ds:uri="http://purl.org/dc/dcmitype/"/>
+    <ds:schemaRef ds:uri="http://purl.org/dc/terms/"/>
+  </ds:schemaRefs>
+</ds:datastoreItem>
 </file>
 
-<file path=customXml/item3.xml><?xml version="1.0" encoding="utf-8"?>
-<?mso-contentType ?>
-<FormTemplates xmlns="http://schemas.microsoft.com/sharepoint/v3/contenttype/forms">
-  <Display>DocumentLibraryForm</Display>
-  <Edit>DocumentLibraryForm</Edit>
-  <New>DocumentLibraryForm</New>
-</FormTemplates>
+<file path=customXml/itemProps2.xml><?xml version="1.0" encoding="utf-8"?>
+<ds:datastoreItem xmlns:ds="http://schemas.openxmlformats.org/officeDocument/2006/customXml" ds:itemID="{B0CA13EC-1D3C-4D6F-8D1C-E8A452CFC79A}">
+  <ds:schemaRefs>
+    <ds:schemaRef ds:uri="http://schemas.microsoft.com/sharepoint/v3/contenttype/forms"/>
+  </ds:schemaRefs>
+</ds:datastoreItem>
 </file>
 
-<file path=customXml/itemProps1.xml><?xml version="1.0" encoding="utf-8"?>
+<file path=customXml/itemProps3.xml><?xml version="1.0" encoding="utf-8"?>
 <ds:datastoreItem xmlns:ds="http://schemas.openxmlformats.org/officeDocument/2006/customXml" ds:itemID="{82E29CF1-14D8-4EA9-9912-77C2B374A353}">
   <ds:schemaRefs>
     <ds:schemaRef ds:uri="http://schemas.microsoft.com/office/2006/metadata/contentType"/>
@@ -47437,29 +47420,4 @@
     <ds:schemaRef ds:uri="http://schemas.microsoft.com/internal/obd"/>
   </ds:schemaRefs>
 </ds:datastoreItem>
-</file>
-
-<file path=customXml/itemProps2.xml><?xml version="1.0" encoding="utf-8"?>
-<ds:datastoreItem xmlns:ds="http://schemas.openxmlformats.org/officeDocument/2006/customXml" ds:itemID="{7025FDD9-4C58-4084-9F89-0E6ADD6FFF55}">
-  <ds:schemaRefs>
-    <ds:schemaRef ds:uri="http://schemas.openxmlformats.org/package/2006/metadata/core-properties"/>
-    <ds:schemaRef ds:uri="http://schemas.microsoft.com/office/2006/documentManagement/types"/>
-    <ds:schemaRef ds:uri="http://schemas.microsoft.com/office/2006/metadata/properties"/>
-    <ds:schemaRef ds:uri="230e9df3-be65-4c73-a93b-d1236ebd677e"/>
-    <ds:schemaRef ds:uri="9144449b-ba5a-4612-98a9-381e907e54b6"/>
-    <ds:schemaRef ds:uri="http://schemas.microsoft.com/office/infopath/2007/PartnerControls"/>
-    <ds:schemaRef ds:uri="http://purl.org/dc/elements/1.1/"/>
-    <ds:schemaRef ds:uri="http://www.w3.org/XML/1998/namespace"/>
-    <ds:schemaRef ds:uri="http://purl.org/dc/dcmitype/"/>
-    <ds:schemaRef ds:uri="http://purl.org/dc/terms/"/>
-  </ds:schemaRefs>
-</ds:datastoreItem>
-</file>
-
-<file path=customXml/itemProps3.xml><?xml version="1.0" encoding="utf-8"?>
-<ds:datastoreItem xmlns:ds="http://schemas.openxmlformats.org/officeDocument/2006/customXml" ds:itemID="{B0CA13EC-1D3C-4D6F-8D1C-E8A452CFC79A}">
-  <ds:schemaRefs>
-    <ds:schemaRef ds:uri="http://schemas.microsoft.com/sharepoint/v3/contenttype/forms"/>
-  </ds:schemaRefs>
-</ds:datastoreItem>
 </file>
</xml_diff>